<commit_message>
continued working on wrap up on decomposition and setting up ESN models
</commit_message>
<xml_diff>
--- a/ESN_wrapUP_decomposition_and_DeepESNs.pptx
+++ b/ESN_wrapUP_decomposition_and_DeepESNs.pptx
@@ -18238,7 +18238,7 @@
         <p:spPr>
           <a:xfrm>
             <a:off x="365769" y="1316182"/>
-            <a:ext cx="11687686" cy="2246769"/>
+            <a:ext cx="11687686" cy="2554545"/>
           </a:xfrm>
           <a:prstGeom prst="rect">
             <a:avLst/>
@@ -18620,12 +18620,9 @@
             </a:r>
             <a:r>
               <a:rPr lang="de-DE" sz="2000" dirty="0" err="1"/>
-              <a:t>market</a:t>
-            </a:r>
-            <a:r>
-              <a:rPr lang="de-DE" sz="2000" dirty="0"/>
-              <a:t>.</a:t>
-            </a:r>
+              <a:t>market).</a:t>
+            </a:r>
+            <a:endParaRPr lang="de-DE" sz="2000" dirty="0"/>
           </a:p>
           <a:p>
             <a:pPr marL="285750" indent="-285750">
@@ -18650,7 +18647,15 @@
             </a:r>
             <a:r>
               <a:rPr lang="de-DE" sz="2000" dirty="0"/>
-              <a:t> summary statistics: high / low volatility regimes</a:t>
+              <a:t> summary statistics. Mean zero, but varying variance over time: high / low volatility </a:t>
+            </a:r>
+            <a:r>
+              <a:rPr lang="de-DE" sz="2000" b="1" dirty="0"/>
+              <a:t>regimes</a:t>
+            </a:r>
+            <a:r>
+              <a:rPr lang="de-DE" sz="2000" dirty="0"/>
+              <a:t>.</a:t>
             </a:r>
           </a:p>
           <a:p>

</xml_diff>

<commit_message>
finished wrap up on decomposition of timeseries and setting up ESN models
</commit_message>
<xml_diff>
--- a/ESN_wrapUP_decomposition_and_DeepESNs.pptx
+++ b/ESN_wrapUP_decomposition_and_DeepESNs.pptx
@@ -5,7 +5,7 @@
     <p:sldMasterId id="2147483648" r:id="rId1"/>
   </p:sldMasterIdLst>
   <p:notesMasterIdLst>
-    <p:notesMasterId r:id="rId11"/>
+    <p:notesMasterId r:id="rId24"/>
   </p:notesMasterIdLst>
   <p:sldIdLst>
     <p:sldId id="257" r:id="rId2"/>
@@ -17,6 +17,19 @@
     <p:sldId id="266" r:id="rId8"/>
     <p:sldId id="267" r:id="rId9"/>
     <p:sldId id="268" r:id="rId10"/>
+    <p:sldId id="269" r:id="rId11"/>
+    <p:sldId id="270" r:id="rId12"/>
+    <p:sldId id="271" r:id="rId13"/>
+    <p:sldId id="272" r:id="rId14"/>
+    <p:sldId id="273" r:id="rId15"/>
+    <p:sldId id="275" r:id="rId16"/>
+    <p:sldId id="276" r:id="rId17"/>
+    <p:sldId id="277" r:id="rId18"/>
+    <p:sldId id="278" r:id="rId19"/>
+    <p:sldId id="279" r:id="rId20"/>
+    <p:sldId id="280" r:id="rId21"/>
+    <p:sldId id="281" r:id="rId22"/>
+    <p:sldId id="282" r:id="rId23"/>
   </p:sldIdLst>
   <p:sldSz cx="12192000" cy="6858000"/>
   <p:notesSz cx="6858000" cy="9144000"/>
@@ -205,7 +218,7 @@
           <a:p>
             <a:fld id="{3AB76ABC-33D1-9C41-94E4-617AD2CE1B7F}" type="datetimeFigureOut">
               <a:rPr lang="de-DE" smtClean="0"/>
-              <a:t>01.03.22</a:t>
+              <a:t>02.03.22</a:t>
             </a:fld>
             <a:endParaRPr lang="de-DE"/>
           </a:p>
@@ -556,6 +569,846 @@
 </p:notes>
 </file>
 
+<file path=ppt/notesSlides/notesSlide10.xml><?xml version="1.0" encoding="utf-8"?>
+<p:notes xmlns:a="http://schemas.openxmlformats.org/drawingml/2006/main" xmlns:r="http://schemas.openxmlformats.org/officeDocument/2006/relationships" xmlns:p="http://schemas.openxmlformats.org/presentationml/2006/main">
+  <p:cSld>
+    <p:spTree>
+      <p:nvGrpSpPr>
+        <p:cNvPr id="1" name=""/>
+        <p:cNvGrpSpPr/>
+        <p:nvPr/>
+      </p:nvGrpSpPr>
+      <p:grpSpPr>
+        <a:xfrm>
+          <a:off x="0" y="0"/>
+          <a:ext cx="0" cy="0"/>
+          <a:chOff x="0" y="0"/>
+          <a:chExt cx="0" cy="0"/>
+        </a:xfrm>
+      </p:grpSpPr>
+      <p:sp>
+        <p:nvSpPr>
+          <p:cNvPr id="2" name="Folienbildplatzhalter 1"/>
+          <p:cNvSpPr>
+            <a:spLocks noGrp="1" noRot="1" noChangeAspect="1"/>
+          </p:cNvSpPr>
+          <p:nvPr>
+            <p:ph type="sldImg"/>
+          </p:nvPr>
+        </p:nvSpPr>
+        <p:spPr/>
+      </p:sp>
+      <p:sp>
+        <p:nvSpPr>
+          <p:cNvPr id="3" name="Notizenplatzhalter 2"/>
+          <p:cNvSpPr>
+            <a:spLocks noGrp="1"/>
+          </p:cNvSpPr>
+          <p:nvPr>
+            <p:ph type="body" idx="1"/>
+          </p:nvPr>
+        </p:nvSpPr>
+        <p:spPr/>
+        <p:txBody>
+          <a:bodyPr/>
+          <a:lstStyle/>
+          <a:p>
+            <a:endParaRPr lang="de-DE" dirty="0"/>
+          </a:p>
+        </p:txBody>
+      </p:sp>
+      <p:sp>
+        <p:nvSpPr>
+          <p:cNvPr id="4" name="Foliennummernplatzhalter 3"/>
+          <p:cNvSpPr>
+            <a:spLocks noGrp="1"/>
+          </p:cNvSpPr>
+          <p:nvPr>
+            <p:ph type="sldNum" sz="quarter" idx="5"/>
+          </p:nvPr>
+        </p:nvSpPr>
+        <p:spPr/>
+        <p:txBody>
+          <a:bodyPr/>
+          <a:lstStyle/>
+          <a:p>
+            <a:fld id="{923DABC9-534C-8B4E-8D84-780BFD0E7F3B}" type="slidenum">
+              <a:rPr lang="de-DE" smtClean="0"/>
+              <a:t>11</a:t>
+            </a:fld>
+            <a:endParaRPr lang="de-DE"/>
+          </a:p>
+        </p:txBody>
+      </p:sp>
+    </p:spTree>
+    <p:extLst>
+      <p:ext uri="{BB962C8B-B14F-4D97-AF65-F5344CB8AC3E}">
+        <p14:creationId xmlns:p14="http://schemas.microsoft.com/office/powerpoint/2010/main" val="2608174154"/>
+      </p:ext>
+    </p:extLst>
+  </p:cSld>
+  <p:clrMapOvr>
+    <a:masterClrMapping/>
+  </p:clrMapOvr>
+</p:notes>
+</file>
+
+<file path=ppt/notesSlides/notesSlide11.xml><?xml version="1.0" encoding="utf-8"?>
+<p:notes xmlns:a="http://schemas.openxmlformats.org/drawingml/2006/main" xmlns:r="http://schemas.openxmlformats.org/officeDocument/2006/relationships" xmlns:p="http://schemas.openxmlformats.org/presentationml/2006/main">
+  <p:cSld>
+    <p:spTree>
+      <p:nvGrpSpPr>
+        <p:cNvPr id="1" name=""/>
+        <p:cNvGrpSpPr/>
+        <p:nvPr/>
+      </p:nvGrpSpPr>
+      <p:grpSpPr>
+        <a:xfrm>
+          <a:off x="0" y="0"/>
+          <a:ext cx="0" cy="0"/>
+          <a:chOff x="0" y="0"/>
+          <a:chExt cx="0" cy="0"/>
+        </a:xfrm>
+      </p:grpSpPr>
+      <p:sp>
+        <p:nvSpPr>
+          <p:cNvPr id="2" name="Folienbildplatzhalter 1"/>
+          <p:cNvSpPr>
+            <a:spLocks noGrp="1" noRot="1" noChangeAspect="1"/>
+          </p:cNvSpPr>
+          <p:nvPr>
+            <p:ph type="sldImg"/>
+          </p:nvPr>
+        </p:nvSpPr>
+        <p:spPr/>
+      </p:sp>
+      <p:sp>
+        <p:nvSpPr>
+          <p:cNvPr id="3" name="Notizenplatzhalter 2"/>
+          <p:cNvSpPr>
+            <a:spLocks noGrp="1"/>
+          </p:cNvSpPr>
+          <p:nvPr>
+            <p:ph type="body" idx="1"/>
+          </p:nvPr>
+        </p:nvSpPr>
+        <p:spPr/>
+        <p:txBody>
+          <a:bodyPr/>
+          <a:lstStyle/>
+          <a:p>
+            <a:endParaRPr lang="de-DE" dirty="0"/>
+          </a:p>
+        </p:txBody>
+      </p:sp>
+      <p:sp>
+        <p:nvSpPr>
+          <p:cNvPr id="4" name="Foliennummernplatzhalter 3"/>
+          <p:cNvSpPr>
+            <a:spLocks noGrp="1"/>
+          </p:cNvSpPr>
+          <p:nvPr>
+            <p:ph type="sldNum" sz="quarter" idx="5"/>
+          </p:nvPr>
+        </p:nvSpPr>
+        <p:spPr/>
+        <p:txBody>
+          <a:bodyPr/>
+          <a:lstStyle/>
+          <a:p>
+            <a:fld id="{923DABC9-534C-8B4E-8D84-780BFD0E7F3B}" type="slidenum">
+              <a:rPr lang="de-DE" smtClean="0"/>
+              <a:t>12</a:t>
+            </a:fld>
+            <a:endParaRPr lang="de-DE"/>
+          </a:p>
+        </p:txBody>
+      </p:sp>
+    </p:spTree>
+    <p:extLst>
+      <p:ext uri="{BB962C8B-B14F-4D97-AF65-F5344CB8AC3E}">
+        <p14:creationId xmlns:p14="http://schemas.microsoft.com/office/powerpoint/2010/main" val="994308187"/>
+      </p:ext>
+    </p:extLst>
+  </p:cSld>
+  <p:clrMapOvr>
+    <a:masterClrMapping/>
+  </p:clrMapOvr>
+</p:notes>
+</file>
+
+<file path=ppt/notesSlides/notesSlide12.xml><?xml version="1.0" encoding="utf-8"?>
+<p:notes xmlns:a="http://schemas.openxmlformats.org/drawingml/2006/main" xmlns:r="http://schemas.openxmlformats.org/officeDocument/2006/relationships" xmlns:p="http://schemas.openxmlformats.org/presentationml/2006/main">
+  <p:cSld>
+    <p:spTree>
+      <p:nvGrpSpPr>
+        <p:cNvPr id="1" name=""/>
+        <p:cNvGrpSpPr/>
+        <p:nvPr/>
+      </p:nvGrpSpPr>
+      <p:grpSpPr>
+        <a:xfrm>
+          <a:off x="0" y="0"/>
+          <a:ext cx="0" cy="0"/>
+          <a:chOff x="0" y="0"/>
+          <a:chExt cx="0" cy="0"/>
+        </a:xfrm>
+      </p:grpSpPr>
+      <p:sp>
+        <p:nvSpPr>
+          <p:cNvPr id="2" name="Folienbildplatzhalter 1"/>
+          <p:cNvSpPr>
+            <a:spLocks noGrp="1" noRot="1" noChangeAspect="1"/>
+          </p:cNvSpPr>
+          <p:nvPr>
+            <p:ph type="sldImg"/>
+          </p:nvPr>
+        </p:nvSpPr>
+        <p:spPr/>
+      </p:sp>
+      <p:sp>
+        <p:nvSpPr>
+          <p:cNvPr id="3" name="Notizenplatzhalter 2"/>
+          <p:cNvSpPr>
+            <a:spLocks noGrp="1"/>
+          </p:cNvSpPr>
+          <p:nvPr>
+            <p:ph type="body" idx="1"/>
+          </p:nvPr>
+        </p:nvSpPr>
+        <p:spPr/>
+        <p:txBody>
+          <a:bodyPr/>
+          <a:lstStyle/>
+          <a:p>
+            <a:endParaRPr lang="de-DE" dirty="0"/>
+          </a:p>
+        </p:txBody>
+      </p:sp>
+      <p:sp>
+        <p:nvSpPr>
+          <p:cNvPr id="4" name="Foliennummernplatzhalter 3"/>
+          <p:cNvSpPr>
+            <a:spLocks noGrp="1"/>
+          </p:cNvSpPr>
+          <p:nvPr>
+            <p:ph type="sldNum" sz="quarter" idx="5"/>
+          </p:nvPr>
+        </p:nvSpPr>
+        <p:spPr/>
+        <p:txBody>
+          <a:bodyPr/>
+          <a:lstStyle/>
+          <a:p>
+            <a:fld id="{923DABC9-534C-8B4E-8D84-780BFD0E7F3B}" type="slidenum">
+              <a:rPr lang="de-DE" smtClean="0"/>
+              <a:t>13</a:t>
+            </a:fld>
+            <a:endParaRPr lang="de-DE"/>
+          </a:p>
+        </p:txBody>
+      </p:sp>
+    </p:spTree>
+    <p:extLst>
+      <p:ext uri="{BB962C8B-B14F-4D97-AF65-F5344CB8AC3E}">
+        <p14:creationId xmlns:p14="http://schemas.microsoft.com/office/powerpoint/2010/main" val="658976942"/>
+      </p:ext>
+    </p:extLst>
+  </p:cSld>
+  <p:clrMapOvr>
+    <a:masterClrMapping/>
+  </p:clrMapOvr>
+</p:notes>
+</file>
+
+<file path=ppt/notesSlides/notesSlide13.xml><?xml version="1.0" encoding="utf-8"?>
+<p:notes xmlns:a="http://schemas.openxmlformats.org/drawingml/2006/main" xmlns:r="http://schemas.openxmlformats.org/officeDocument/2006/relationships" xmlns:p="http://schemas.openxmlformats.org/presentationml/2006/main">
+  <p:cSld>
+    <p:spTree>
+      <p:nvGrpSpPr>
+        <p:cNvPr id="1" name=""/>
+        <p:cNvGrpSpPr/>
+        <p:nvPr/>
+      </p:nvGrpSpPr>
+      <p:grpSpPr>
+        <a:xfrm>
+          <a:off x="0" y="0"/>
+          <a:ext cx="0" cy="0"/>
+          <a:chOff x="0" y="0"/>
+          <a:chExt cx="0" cy="0"/>
+        </a:xfrm>
+      </p:grpSpPr>
+      <p:sp>
+        <p:nvSpPr>
+          <p:cNvPr id="2" name="Folienbildplatzhalter 1"/>
+          <p:cNvSpPr>
+            <a:spLocks noGrp="1" noRot="1" noChangeAspect="1"/>
+          </p:cNvSpPr>
+          <p:nvPr>
+            <p:ph type="sldImg"/>
+          </p:nvPr>
+        </p:nvSpPr>
+        <p:spPr/>
+      </p:sp>
+      <p:sp>
+        <p:nvSpPr>
+          <p:cNvPr id="3" name="Notizenplatzhalter 2"/>
+          <p:cNvSpPr>
+            <a:spLocks noGrp="1"/>
+          </p:cNvSpPr>
+          <p:nvPr>
+            <p:ph type="body" idx="1"/>
+          </p:nvPr>
+        </p:nvSpPr>
+        <p:spPr/>
+        <p:txBody>
+          <a:bodyPr/>
+          <a:lstStyle/>
+          <a:p>
+            <a:endParaRPr lang="de-DE" dirty="0"/>
+          </a:p>
+        </p:txBody>
+      </p:sp>
+      <p:sp>
+        <p:nvSpPr>
+          <p:cNvPr id="4" name="Foliennummernplatzhalter 3"/>
+          <p:cNvSpPr>
+            <a:spLocks noGrp="1"/>
+          </p:cNvSpPr>
+          <p:nvPr>
+            <p:ph type="sldNum" sz="quarter" idx="5"/>
+          </p:nvPr>
+        </p:nvSpPr>
+        <p:spPr/>
+        <p:txBody>
+          <a:bodyPr/>
+          <a:lstStyle/>
+          <a:p>
+            <a:fld id="{923DABC9-534C-8B4E-8D84-780BFD0E7F3B}" type="slidenum">
+              <a:rPr lang="de-DE" smtClean="0"/>
+              <a:t>14</a:t>
+            </a:fld>
+            <a:endParaRPr lang="de-DE"/>
+          </a:p>
+        </p:txBody>
+      </p:sp>
+    </p:spTree>
+    <p:extLst>
+      <p:ext uri="{BB962C8B-B14F-4D97-AF65-F5344CB8AC3E}">
+        <p14:creationId xmlns:p14="http://schemas.microsoft.com/office/powerpoint/2010/main" val="2195660222"/>
+      </p:ext>
+    </p:extLst>
+  </p:cSld>
+  <p:clrMapOvr>
+    <a:masterClrMapping/>
+  </p:clrMapOvr>
+</p:notes>
+</file>
+
+<file path=ppt/notesSlides/notesSlide14.xml><?xml version="1.0" encoding="utf-8"?>
+<p:notes xmlns:a="http://schemas.openxmlformats.org/drawingml/2006/main" xmlns:r="http://schemas.openxmlformats.org/officeDocument/2006/relationships" xmlns:p="http://schemas.openxmlformats.org/presentationml/2006/main">
+  <p:cSld>
+    <p:spTree>
+      <p:nvGrpSpPr>
+        <p:cNvPr id="1" name=""/>
+        <p:cNvGrpSpPr/>
+        <p:nvPr/>
+      </p:nvGrpSpPr>
+      <p:grpSpPr>
+        <a:xfrm>
+          <a:off x="0" y="0"/>
+          <a:ext cx="0" cy="0"/>
+          <a:chOff x="0" y="0"/>
+          <a:chExt cx="0" cy="0"/>
+        </a:xfrm>
+      </p:grpSpPr>
+      <p:sp>
+        <p:nvSpPr>
+          <p:cNvPr id="2" name="Folienbildplatzhalter 1"/>
+          <p:cNvSpPr>
+            <a:spLocks noGrp="1" noRot="1" noChangeAspect="1"/>
+          </p:cNvSpPr>
+          <p:nvPr>
+            <p:ph type="sldImg"/>
+          </p:nvPr>
+        </p:nvSpPr>
+        <p:spPr/>
+      </p:sp>
+      <p:sp>
+        <p:nvSpPr>
+          <p:cNvPr id="3" name="Notizenplatzhalter 2"/>
+          <p:cNvSpPr>
+            <a:spLocks noGrp="1"/>
+          </p:cNvSpPr>
+          <p:nvPr>
+            <p:ph type="body" idx="1"/>
+          </p:nvPr>
+        </p:nvSpPr>
+        <p:spPr/>
+        <p:txBody>
+          <a:bodyPr/>
+          <a:lstStyle/>
+          <a:p>
+            <a:endParaRPr lang="de-DE" dirty="0"/>
+          </a:p>
+        </p:txBody>
+      </p:sp>
+      <p:sp>
+        <p:nvSpPr>
+          <p:cNvPr id="4" name="Foliennummernplatzhalter 3"/>
+          <p:cNvSpPr>
+            <a:spLocks noGrp="1"/>
+          </p:cNvSpPr>
+          <p:nvPr>
+            <p:ph type="sldNum" sz="quarter" idx="5"/>
+          </p:nvPr>
+        </p:nvSpPr>
+        <p:spPr/>
+        <p:txBody>
+          <a:bodyPr/>
+          <a:lstStyle/>
+          <a:p>
+            <a:fld id="{923DABC9-534C-8B4E-8D84-780BFD0E7F3B}" type="slidenum">
+              <a:rPr lang="de-DE" smtClean="0"/>
+              <a:t>15</a:t>
+            </a:fld>
+            <a:endParaRPr lang="de-DE"/>
+          </a:p>
+        </p:txBody>
+      </p:sp>
+    </p:spTree>
+    <p:extLst>
+      <p:ext uri="{BB962C8B-B14F-4D97-AF65-F5344CB8AC3E}">
+        <p14:creationId xmlns:p14="http://schemas.microsoft.com/office/powerpoint/2010/main" val="3105393251"/>
+      </p:ext>
+    </p:extLst>
+  </p:cSld>
+  <p:clrMapOvr>
+    <a:masterClrMapping/>
+  </p:clrMapOvr>
+</p:notes>
+</file>
+
+<file path=ppt/notesSlides/notesSlide15.xml><?xml version="1.0" encoding="utf-8"?>
+<p:notes xmlns:a="http://schemas.openxmlformats.org/drawingml/2006/main" xmlns:r="http://schemas.openxmlformats.org/officeDocument/2006/relationships" xmlns:p="http://schemas.openxmlformats.org/presentationml/2006/main">
+  <p:cSld>
+    <p:spTree>
+      <p:nvGrpSpPr>
+        <p:cNvPr id="1" name=""/>
+        <p:cNvGrpSpPr/>
+        <p:nvPr/>
+      </p:nvGrpSpPr>
+      <p:grpSpPr>
+        <a:xfrm>
+          <a:off x="0" y="0"/>
+          <a:ext cx="0" cy="0"/>
+          <a:chOff x="0" y="0"/>
+          <a:chExt cx="0" cy="0"/>
+        </a:xfrm>
+      </p:grpSpPr>
+      <p:sp>
+        <p:nvSpPr>
+          <p:cNvPr id="2" name="Folienbildplatzhalter 1"/>
+          <p:cNvSpPr>
+            <a:spLocks noGrp="1" noRot="1" noChangeAspect="1"/>
+          </p:cNvSpPr>
+          <p:nvPr>
+            <p:ph type="sldImg"/>
+          </p:nvPr>
+        </p:nvSpPr>
+        <p:spPr/>
+      </p:sp>
+      <p:sp>
+        <p:nvSpPr>
+          <p:cNvPr id="3" name="Notizenplatzhalter 2"/>
+          <p:cNvSpPr>
+            <a:spLocks noGrp="1"/>
+          </p:cNvSpPr>
+          <p:nvPr>
+            <p:ph type="body" idx="1"/>
+          </p:nvPr>
+        </p:nvSpPr>
+        <p:spPr/>
+        <p:txBody>
+          <a:bodyPr/>
+          <a:lstStyle/>
+          <a:p>
+            <a:endParaRPr lang="de-DE" dirty="0"/>
+          </a:p>
+        </p:txBody>
+      </p:sp>
+      <p:sp>
+        <p:nvSpPr>
+          <p:cNvPr id="4" name="Foliennummernplatzhalter 3"/>
+          <p:cNvSpPr>
+            <a:spLocks noGrp="1"/>
+          </p:cNvSpPr>
+          <p:nvPr>
+            <p:ph type="sldNum" sz="quarter" idx="5"/>
+          </p:nvPr>
+        </p:nvSpPr>
+        <p:spPr/>
+        <p:txBody>
+          <a:bodyPr/>
+          <a:lstStyle/>
+          <a:p>
+            <a:fld id="{923DABC9-534C-8B4E-8D84-780BFD0E7F3B}" type="slidenum">
+              <a:rPr lang="de-DE" smtClean="0"/>
+              <a:t>16</a:t>
+            </a:fld>
+            <a:endParaRPr lang="de-DE"/>
+          </a:p>
+        </p:txBody>
+      </p:sp>
+    </p:spTree>
+    <p:extLst>
+      <p:ext uri="{BB962C8B-B14F-4D97-AF65-F5344CB8AC3E}">
+        <p14:creationId xmlns:p14="http://schemas.microsoft.com/office/powerpoint/2010/main" val="3167005563"/>
+      </p:ext>
+    </p:extLst>
+  </p:cSld>
+  <p:clrMapOvr>
+    <a:masterClrMapping/>
+  </p:clrMapOvr>
+</p:notes>
+</file>
+
+<file path=ppt/notesSlides/notesSlide16.xml><?xml version="1.0" encoding="utf-8"?>
+<p:notes xmlns:a="http://schemas.openxmlformats.org/drawingml/2006/main" xmlns:r="http://schemas.openxmlformats.org/officeDocument/2006/relationships" xmlns:p="http://schemas.openxmlformats.org/presentationml/2006/main">
+  <p:cSld>
+    <p:spTree>
+      <p:nvGrpSpPr>
+        <p:cNvPr id="1" name=""/>
+        <p:cNvGrpSpPr/>
+        <p:nvPr/>
+      </p:nvGrpSpPr>
+      <p:grpSpPr>
+        <a:xfrm>
+          <a:off x="0" y="0"/>
+          <a:ext cx="0" cy="0"/>
+          <a:chOff x="0" y="0"/>
+          <a:chExt cx="0" cy="0"/>
+        </a:xfrm>
+      </p:grpSpPr>
+      <p:sp>
+        <p:nvSpPr>
+          <p:cNvPr id="2" name="Folienbildplatzhalter 1"/>
+          <p:cNvSpPr>
+            <a:spLocks noGrp="1" noRot="1" noChangeAspect="1"/>
+          </p:cNvSpPr>
+          <p:nvPr>
+            <p:ph type="sldImg"/>
+          </p:nvPr>
+        </p:nvSpPr>
+        <p:spPr/>
+      </p:sp>
+      <p:sp>
+        <p:nvSpPr>
+          <p:cNvPr id="3" name="Notizenplatzhalter 2"/>
+          <p:cNvSpPr>
+            <a:spLocks noGrp="1"/>
+          </p:cNvSpPr>
+          <p:nvPr>
+            <p:ph type="body" idx="1"/>
+          </p:nvPr>
+        </p:nvSpPr>
+        <p:spPr/>
+        <p:txBody>
+          <a:bodyPr/>
+          <a:lstStyle/>
+          <a:p>
+            <a:endParaRPr lang="de-DE" dirty="0"/>
+          </a:p>
+        </p:txBody>
+      </p:sp>
+      <p:sp>
+        <p:nvSpPr>
+          <p:cNvPr id="4" name="Foliennummernplatzhalter 3"/>
+          <p:cNvSpPr>
+            <a:spLocks noGrp="1"/>
+          </p:cNvSpPr>
+          <p:nvPr>
+            <p:ph type="sldNum" sz="quarter" idx="5"/>
+          </p:nvPr>
+        </p:nvSpPr>
+        <p:spPr/>
+        <p:txBody>
+          <a:bodyPr/>
+          <a:lstStyle/>
+          <a:p>
+            <a:fld id="{923DABC9-534C-8B4E-8D84-780BFD0E7F3B}" type="slidenum">
+              <a:rPr lang="de-DE" smtClean="0"/>
+              <a:t>17</a:t>
+            </a:fld>
+            <a:endParaRPr lang="de-DE"/>
+          </a:p>
+        </p:txBody>
+      </p:sp>
+    </p:spTree>
+    <p:extLst>
+      <p:ext uri="{BB962C8B-B14F-4D97-AF65-F5344CB8AC3E}">
+        <p14:creationId xmlns:p14="http://schemas.microsoft.com/office/powerpoint/2010/main" val="3498312755"/>
+      </p:ext>
+    </p:extLst>
+  </p:cSld>
+  <p:clrMapOvr>
+    <a:masterClrMapping/>
+  </p:clrMapOvr>
+</p:notes>
+</file>
+
+<file path=ppt/notesSlides/notesSlide17.xml><?xml version="1.0" encoding="utf-8"?>
+<p:notes xmlns:a="http://schemas.openxmlformats.org/drawingml/2006/main" xmlns:r="http://schemas.openxmlformats.org/officeDocument/2006/relationships" xmlns:p="http://schemas.openxmlformats.org/presentationml/2006/main">
+  <p:cSld>
+    <p:spTree>
+      <p:nvGrpSpPr>
+        <p:cNvPr id="1" name=""/>
+        <p:cNvGrpSpPr/>
+        <p:nvPr/>
+      </p:nvGrpSpPr>
+      <p:grpSpPr>
+        <a:xfrm>
+          <a:off x="0" y="0"/>
+          <a:ext cx="0" cy="0"/>
+          <a:chOff x="0" y="0"/>
+          <a:chExt cx="0" cy="0"/>
+        </a:xfrm>
+      </p:grpSpPr>
+      <p:sp>
+        <p:nvSpPr>
+          <p:cNvPr id="2" name="Folienbildplatzhalter 1"/>
+          <p:cNvSpPr>
+            <a:spLocks noGrp="1" noRot="1" noChangeAspect="1"/>
+          </p:cNvSpPr>
+          <p:nvPr>
+            <p:ph type="sldImg"/>
+          </p:nvPr>
+        </p:nvSpPr>
+        <p:spPr/>
+      </p:sp>
+      <p:sp>
+        <p:nvSpPr>
+          <p:cNvPr id="3" name="Notizenplatzhalter 2"/>
+          <p:cNvSpPr>
+            <a:spLocks noGrp="1"/>
+          </p:cNvSpPr>
+          <p:nvPr>
+            <p:ph type="body" idx="1"/>
+          </p:nvPr>
+        </p:nvSpPr>
+        <p:spPr/>
+        <p:txBody>
+          <a:bodyPr/>
+          <a:lstStyle/>
+          <a:p>
+            <a:endParaRPr lang="de-DE" dirty="0"/>
+          </a:p>
+        </p:txBody>
+      </p:sp>
+      <p:sp>
+        <p:nvSpPr>
+          <p:cNvPr id="4" name="Foliennummernplatzhalter 3"/>
+          <p:cNvSpPr>
+            <a:spLocks noGrp="1"/>
+          </p:cNvSpPr>
+          <p:nvPr>
+            <p:ph type="sldNum" sz="quarter" idx="5"/>
+          </p:nvPr>
+        </p:nvSpPr>
+        <p:spPr/>
+        <p:txBody>
+          <a:bodyPr/>
+          <a:lstStyle/>
+          <a:p>
+            <a:fld id="{923DABC9-534C-8B4E-8D84-780BFD0E7F3B}" type="slidenum">
+              <a:rPr lang="de-DE" smtClean="0"/>
+              <a:t>18</a:t>
+            </a:fld>
+            <a:endParaRPr lang="de-DE"/>
+          </a:p>
+        </p:txBody>
+      </p:sp>
+    </p:spTree>
+    <p:extLst>
+      <p:ext uri="{BB962C8B-B14F-4D97-AF65-F5344CB8AC3E}">
+        <p14:creationId xmlns:p14="http://schemas.microsoft.com/office/powerpoint/2010/main" val="1877903303"/>
+      </p:ext>
+    </p:extLst>
+  </p:cSld>
+  <p:clrMapOvr>
+    <a:masterClrMapping/>
+  </p:clrMapOvr>
+</p:notes>
+</file>
+
+<file path=ppt/notesSlides/notesSlide18.xml><?xml version="1.0" encoding="utf-8"?>
+<p:notes xmlns:a="http://schemas.openxmlformats.org/drawingml/2006/main" xmlns:r="http://schemas.openxmlformats.org/officeDocument/2006/relationships" xmlns:p="http://schemas.openxmlformats.org/presentationml/2006/main">
+  <p:cSld>
+    <p:spTree>
+      <p:nvGrpSpPr>
+        <p:cNvPr id="1" name=""/>
+        <p:cNvGrpSpPr/>
+        <p:nvPr/>
+      </p:nvGrpSpPr>
+      <p:grpSpPr>
+        <a:xfrm>
+          <a:off x="0" y="0"/>
+          <a:ext cx="0" cy="0"/>
+          <a:chOff x="0" y="0"/>
+          <a:chExt cx="0" cy="0"/>
+        </a:xfrm>
+      </p:grpSpPr>
+      <p:sp>
+        <p:nvSpPr>
+          <p:cNvPr id="2" name="Folienbildplatzhalter 1"/>
+          <p:cNvSpPr>
+            <a:spLocks noGrp="1" noRot="1" noChangeAspect="1"/>
+          </p:cNvSpPr>
+          <p:nvPr>
+            <p:ph type="sldImg"/>
+          </p:nvPr>
+        </p:nvSpPr>
+        <p:spPr/>
+      </p:sp>
+      <p:sp>
+        <p:nvSpPr>
+          <p:cNvPr id="3" name="Notizenplatzhalter 2"/>
+          <p:cNvSpPr>
+            <a:spLocks noGrp="1"/>
+          </p:cNvSpPr>
+          <p:nvPr>
+            <p:ph type="body" idx="1"/>
+          </p:nvPr>
+        </p:nvSpPr>
+        <p:spPr/>
+        <p:txBody>
+          <a:bodyPr/>
+          <a:lstStyle/>
+          <a:p>
+            <a:endParaRPr lang="de-DE" dirty="0"/>
+          </a:p>
+        </p:txBody>
+      </p:sp>
+      <p:sp>
+        <p:nvSpPr>
+          <p:cNvPr id="4" name="Foliennummernplatzhalter 3"/>
+          <p:cNvSpPr>
+            <a:spLocks noGrp="1"/>
+          </p:cNvSpPr>
+          <p:nvPr>
+            <p:ph type="sldNum" sz="quarter" idx="5"/>
+          </p:nvPr>
+        </p:nvSpPr>
+        <p:spPr/>
+        <p:txBody>
+          <a:bodyPr/>
+          <a:lstStyle/>
+          <a:p>
+            <a:fld id="{923DABC9-534C-8B4E-8D84-780BFD0E7F3B}" type="slidenum">
+              <a:rPr lang="de-DE" smtClean="0"/>
+              <a:t>19</a:t>
+            </a:fld>
+            <a:endParaRPr lang="de-DE"/>
+          </a:p>
+        </p:txBody>
+      </p:sp>
+    </p:spTree>
+    <p:extLst>
+      <p:ext uri="{BB962C8B-B14F-4D97-AF65-F5344CB8AC3E}">
+        <p14:creationId xmlns:p14="http://schemas.microsoft.com/office/powerpoint/2010/main" val="3791067399"/>
+      </p:ext>
+    </p:extLst>
+  </p:cSld>
+  <p:clrMapOvr>
+    <a:masterClrMapping/>
+  </p:clrMapOvr>
+</p:notes>
+</file>
+
+<file path=ppt/notesSlides/notesSlide19.xml><?xml version="1.0" encoding="utf-8"?>
+<p:notes xmlns:a="http://schemas.openxmlformats.org/drawingml/2006/main" xmlns:r="http://schemas.openxmlformats.org/officeDocument/2006/relationships" xmlns:p="http://schemas.openxmlformats.org/presentationml/2006/main">
+  <p:cSld>
+    <p:spTree>
+      <p:nvGrpSpPr>
+        <p:cNvPr id="1" name=""/>
+        <p:cNvGrpSpPr/>
+        <p:nvPr/>
+      </p:nvGrpSpPr>
+      <p:grpSpPr>
+        <a:xfrm>
+          <a:off x="0" y="0"/>
+          <a:ext cx="0" cy="0"/>
+          <a:chOff x="0" y="0"/>
+          <a:chExt cx="0" cy="0"/>
+        </a:xfrm>
+      </p:grpSpPr>
+      <p:sp>
+        <p:nvSpPr>
+          <p:cNvPr id="2" name="Folienbildplatzhalter 1"/>
+          <p:cNvSpPr>
+            <a:spLocks noGrp="1" noRot="1" noChangeAspect="1"/>
+          </p:cNvSpPr>
+          <p:nvPr>
+            <p:ph type="sldImg"/>
+          </p:nvPr>
+        </p:nvSpPr>
+        <p:spPr/>
+      </p:sp>
+      <p:sp>
+        <p:nvSpPr>
+          <p:cNvPr id="3" name="Notizenplatzhalter 2"/>
+          <p:cNvSpPr>
+            <a:spLocks noGrp="1"/>
+          </p:cNvSpPr>
+          <p:nvPr>
+            <p:ph type="body" idx="1"/>
+          </p:nvPr>
+        </p:nvSpPr>
+        <p:spPr/>
+        <p:txBody>
+          <a:bodyPr/>
+          <a:lstStyle/>
+          <a:p>
+            <a:endParaRPr lang="de-DE" dirty="0"/>
+          </a:p>
+        </p:txBody>
+      </p:sp>
+      <p:sp>
+        <p:nvSpPr>
+          <p:cNvPr id="4" name="Foliennummernplatzhalter 3"/>
+          <p:cNvSpPr>
+            <a:spLocks noGrp="1"/>
+          </p:cNvSpPr>
+          <p:nvPr>
+            <p:ph type="sldNum" sz="quarter" idx="5"/>
+          </p:nvPr>
+        </p:nvSpPr>
+        <p:spPr/>
+        <p:txBody>
+          <a:bodyPr/>
+          <a:lstStyle/>
+          <a:p>
+            <a:fld id="{923DABC9-534C-8B4E-8D84-780BFD0E7F3B}" type="slidenum">
+              <a:rPr lang="de-DE" smtClean="0"/>
+              <a:t>20</a:t>
+            </a:fld>
+            <a:endParaRPr lang="de-DE"/>
+          </a:p>
+        </p:txBody>
+      </p:sp>
+    </p:spTree>
+    <p:extLst>
+      <p:ext uri="{BB962C8B-B14F-4D97-AF65-F5344CB8AC3E}">
+        <p14:creationId xmlns:p14="http://schemas.microsoft.com/office/powerpoint/2010/main" val="4262266034"/>
+      </p:ext>
+    </p:extLst>
+  </p:cSld>
+  <p:clrMapOvr>
+    <a:masterClrMapping/>
+  </p:clrMapOvr>
+</p:notes>
+</file>
+
 <file path=ppt/notesSlides/notesSlide2.xml><?xml version="1.0" encoding="utf-8"?>
 <p:notes xmlns:a="http://schemas.openxmlformats.org/drawingml/2006/main" xmlns:r="http://schemas.openxmlformats.org/officeDocument/2006/relationships" xmlns:p="http://schemas.openxmlformats.org/presentationml/2006/main">
   <p:cSld>
@@ -631,6 +1484,174 @@
     <p:extLst>
       <p:ext uri="{BB962C8B-B14F-4D97-AF65-F5344CB8AC3E}">
         <p14:creationId xmlns:p14="http://schemas.microsoft.com/office/powerpoint/2010/main" val="2848153249"/>
+      </p:ext>
+    </p:extLst>
+  </p:cSld>
+  <p:clrMapOvr>
+    <a:masterClrMapping/>
+  </p:clrMapOvr>
+</p:notes>
+</file>
+
+<file path=ppt/notesSlides/notesSlide20.xml><?xml version="1.0" encoding="utf-8"?>
+<p:notes xmlns:a="http://schemas.openxmlformats.org/drawingml/2006/main" xmlns:r="http://schemas.openxmlformats.org/officeDocument/2006/relationships" xmlns:p="http://schemas.openxmlformats.org/presentationml/2006/main">
+  <p:cSld>
+    <p:spTree>
+      <p:nvGrpSpPr>
+        <p:cNvPr id="1" name=""/>
+        <p:cNvGrpSpPr/>
+        <p:nvPr/>
+      </p:nvGrpSpPr>
+      <p:grpSpPr>
+        <a:xfrm>
+          <a:off x="0" y="0"/>
+          <a:ext cx="0" cy="0"/>
+          <a:chOff x="0" y="0"/>
+          <a:chExt cx="0" cy="0"/>
+        </a:xfrm>
+      </p:grpSpPr>
+      <p:sp>
+        <p:nvSpPr>
+          <p:cNvPr id="2" name="Folienbildplatzhalter 1"/>
+          <p:cNvSpPr>
+            <a:spLocks noGrp="1" noRot="1" noChangeAspect="1"/>
+          </p:cNvSpPr>
+          <p:nvPr>
+            <p:ph type="sldImg"/>
+          </p:nvPr>
+        </p:nvSpPr>
+        <p:spPr/>
+      </p:sp>
+      <p:sp>
+        <p:nvSpPr>
+          <p:cNvPr id="3" name="Notizenplatzhalter 2"/>
+          <p:cNvSpPr>
+            <a:spLocks noGrp="1"/>
+          </p:cNvSpPr>
+          <p:nvPr>
+            <p:ph type="body" idx="1"/>
+          </p:nvPr>
+        </p:nvSpPr>
+        <p:spPr/>
+        <p:txBody>
+          <a:bodyPr/>
+          <a:lstStyle/>
+          <a:p>
+            <a:endParaRPr lang="de-DE" dirty="0"/>
+          </a:p>
+        </p:txBody>
+      </p:sp>
+      <p:sp>
+        <p:nvSpPr>
+          <p:cNvPr id="4" name="Foliennummernplatzhalter 3"/>
+          <p:cNvSpPr>
+            <a:spLocks noGrp="1"/>
+          </p:cNvSpPr>
+          <p:nvPr>
+            <p:ph type="sldNum" sz="quarter" idx="5"/>
+          </p:nvPr>
+        </p:nvSpPr>
+        <p:spPr/>
+        <p:txBody>
+          <a:bodyPr/>
+          <a:lstStyle/>
+          <a:p>
+            <a:fld id="{923DABC9-534C-8B4E-8D84-780BFD0E7F3B}" type="slidenum">
+              <a:rPr lang="de-DE" smtClean="0"/>
+              <a:t>21</a:t>
+            </a:fld>
+            <a:endParaRPr lang="de-DE"/>
+          </a:p>
+        </p:txBody>
+      </p:sp>
+    </p:spTree>
+    <p:extLst>
+      <p:ext uri="{BB962C8B-B14F-4D97-AF65-F5344CB8AC3E}">
+        <p14:creationId xmlns:p14="http://schemas.microsoft.com/office/powerpoint/2010/main" val="20171528"/>
+      </p:ext>
+    </p:extLst>
+  </p:cSld>
+  <p:clrMapOvr>
+    <a:masterClrMapping/>
+  </p:clrMapOvr>
+</p:notes>
+</file>
+
+<file path=ppt/notesSlides/notesSlide21.xml><?xml version="1.0" encoding="utf-8"?>
+<p:notes xmlns:a="http://schemas.openxmlformats.org/drawingml/2006/main" xmlns:r="http://schemas.openxmlformats.org/officeDocument/2006/relationships" xmlns:p="http://schemas.openxmlformats.org/presentationml/2006/main">
+  <p:cSld>
+    <p:spTree>
+      <p:nvGrpSpPr>
+        <p:cNvPr id="1" name=""/>
+        <p:cNvGrpSpPr/>
+        <p:nvPr/>
+      </p:nvGrpSpPr>
+      <p:grpSpPr>
+        <a:xfrm>
+          <a:off x="0" y="0"/>
+          <a:ext cx="0" cy="0"/>
+          <a:chOff x="0" y="0"/>
+          <a:chExt cx="0" cy="0"/>
+        </a:xfrm>
+      </p:grpSpPr>
+      <p:sp>
+        <p:nvSpPr>
+          <p:cNvPr id="2" name="Folienbildplatzhalter 1"/>
+          <p:cNvSpPr>
+            <a:spLocks noGrp="1" noRot="1" noChangeAspect="1"/>
+          </p:cNvSpPr>
+          <p:nvPr>
+            <p:ph type="sldImg"/>
+          </p:nvPr>
+        </p:nvSpPr>
+        <p:spPr/>
+      </p:sp>
+      <p:sp>
+        <p:nvSpPr>
+          <p:cNvPr id="3" name="Notizenplatzhalter 2"/>
+          <p:cNvSpPr>
+            <a:spLocks noGrp="1"/>
+          </p:cNvSpPr>
+          <p:nvPr>
+            <p:ph type="body" idx="1"/>
+          </p:nvPr>
+        </p:nvSpPr>
+        <p:spPr/>
+        <p:txBody>
+          <a:bodyPr/>
+          <a:lstStyle/>
+          <a:p>
+            <a:endParaRPr lang="de-DE" dirty="0"/>
+          </a:p>
+        </p:txBody>
+      </p:sp>
+      <p:sp>
+        <p:nvSpPr>
+          <p:cNvPr id="4" name="Foliennummernplatzhalter 3"/>
+          <p:cNvSpPr>
+            <a:spLocks noGrp="1"/>
+          </p:cNvSpPr>
+          <p:nvPr>
+            <p:ph type="sldNum" sz="quarter" idx="5"/>
+          </p:nvPr>
+        </p:nvSpPr>
+        <p:spPr/>
+        <p:txBody>
+          <a:bodyPr/>
+          <a:lstStyle/>
+          <a:p>
+            <a:fld id="{923DABC9-534C-8B4E-8D84-780BFD0E7F3B}" type="slidenum">
+              <a:rPr lang="de-DE" smtClean="0"/>
+              <a:t>22</a:t>
+            </a:fld>
+            <a:endParaRPr lang="de-DE"/>
+          </a:p>
+        </p:txBody>
+      </p:sp>
+    </p:spTree>
+    <p:extLst>
+      <p:ext uri="{BB962C8B-B14F-4D97-AF65-F5344CB8AC3E}">
+        <p14:creationId xmlns:p14="http://schemas.microsoft.com/office/powerpoint/2010/main" val="1434931326"/>
       </p:ext>
     </p:extLst>
   </p:cSld>
@@ -1135,6 +2156,90 @@
     <p:extLst>
       <p:ext uri="{BB962C8B-B14F-4D97-AF65-F5344CB8AC3E}">
         <p14:creationId xmlns:p14="http://schemas.microsoft.com/office/powerpoint/2010/main" val="1373100696"/>
+      </p:ext>
+    </p:extLst>
+  </p:cSld>
+  <p:clrMapOvr>
+    <a:masterClrMapping/>
+  </p:clrMapOvr>
+</p:notes>
+</file>
+
+<file path=ppt/notesSlides/notesSlide9.xml><?xml version="1.0" encoding="utf-8"?>
+<p:notes xmlns:a="http://schemas.openxmlformats.org/drawingml/2006/main" xmlns:r="http://schemas.openxmlformats.org/officeDocument/2006/relationships" xmlns:p="http://schemas.openxmlformats.org/presentationml/2006/main">
+  <p:cSld>
+    <p:spTree>
+      <p:nvGrpSpPr>
+        <p:cNvPr id="1" name=""/>
+        <p:cNvGrpSpPr/>
+        <p:nvPr/>
+      </p:nvGrpSpPr>
+      <p:grpSpPr>
+        <a:xfrm>
+          <a:off x="0" y="0"/>
+          <a:ext cx="0" cy="0"/>
+          <a:chOff x="0" y="0"/>
+          <a:chExt cx="0" cy="0"/>
+        </a:xfrm>
+      </p:grpSpPr>
+      <p:sp>
+        <p:nvSpPr>
+          <p:cNvPr id="2" name="Folienbildplatzhalter 1"/>
+          <p:cNvSpPr>
+            <a:spLocks noGrp="1" noRot="1" noChangeAspect="1"/>
+          </p:cNvSpPr>
+          <p:nvPr>
+            <p:ph type="sldImg"/>
+          </p:nvPr>
+        </p:nvSpPr>
+        <p:spPr/>
+      </p:sp>
+      <p:sp>
+        <p:nvSpPr>
+          <p:cNvPr id="3" name="Notizenplatzhalter 2"/>
+          <p:cNvSpPr>
+            <a:spLocks noGrp="1"/>
+          </p:cNvSpPr>
+          <p:nvPr>
+            <p:ph type="body" idx="1"/>
+          </p:nvPr>
+        </p:nvSpPr>
+        <p:spPr/>
+        <p:txBody>
+          <a:bodyPr/>
+          <a:lstStyle/>
+          <a:p>
+            <a:endParaRPr lang="de-DE" dirty="0"/>
+          </a:p>
+        </p:txBody>
+      </p:sp>
+      <p:sp>
+        <p:nvSpPr>
+          <p:cNvPr id="4" name="Foliennummernplatzhalter 3"/>
+          <p:cNvSpPr>
+            <a:spLocks noGrp="1"/>
+          </p:cNvSpPr>
+          <p:nvPr>
+            <p:ph type="sldNum" sz="quarter" idx="5"/>
+          </p:nvPr>
+        </p:nvSpPr>
+        <p:spPr/>
+        <p:txBody>
+          <a:bodyPr/>
+          <a:lstStyle/>
+          <a:p>
+            <a:fld id="{923DABC9-534C-8B4E-8D84-780BFD0E7F3B}" type="slidenum">
+              <a:rPr lang="de-DE" smtClean="0"/>
+              <a:t>10</a:t>
+            </a:fld>
+            <a:endParaRPr lang="de-DE"/>
+          </a:p>
+        </p:txBody>
+      </p:sp>
+    </p:spTree>
+    <p:extLst>
+      <p:ext uri="{BB962C8B-B14F-4D97-AF65-F5344CB8AC3E}">
+        <p14:creationId xmlns:p14="http://schemas.microsoft.com/office/powerpoint/2010/main" val="3278116595"/>
       </p:ext>
     </p:extLst>
   </p:cSld>
@@ -1291,7 +2396,7 @@
           <a:p>
             <a:fld id="{4A66F40E-0BE7-7441-94CB-0CED3EF25F1E}" type="datetimeFigureOut">
               <a:rPr lang="de-DE" smtClean="0"/>
-              <a:t>01.03.22</a:t>
+              <a:t>02.03.22</a:t>
             </a:fld>
             <a:endParaRPr lang="de-DE"/>
           </a:p>
@@ -1489,7 +2594,7 @@
           <a:p>
             <a:fld id="{4A66F40E-0BE7-7441-94CB-0CED3EF25F1E}" type="datetimeFigureOut">
               <a:rPr lang="de-DE" smtClean="0"/>
-              <a:t>01.03.22</a:t>
+              <a:t>02.03.22</a:t>
             </a:fld>
             <a:endParaRPr lang="de-DE"/>
           </a:p>
@@ -1697,7 +2802,7 @@
           <a:p>
             <a:fld id="{4A66F40E-0BE7-7441-94CB-0CED3EF25F1E}" type="datetimeFigureOut">
               <a:rPr lang="de-DE" smtClean="0"/>
-              <a:t>01.03.22</a:t>
+              <a:t>02.03.22</a:t>
             </a:fld>
             <a:endParaRPr lang="de-DE"/>
           </a:p>
@@ -1895,7 +3000,7 @@
           <a:p>
             <a:fld id="{4A66F40E-0BE7-7441-94CB-0CED3EF25F1E}" type="datetimeFigureOut">
               <a:rPr lang="de-DE" smtClean="0"/>
-              <a:t>01.03.22</a:t>
+              <a:t>02.03.22</a:t>
             </a:fld>
             <a:endParaRPr lang="de-DE"/>
           </a:p>
@@ -2170,7 +3275,7 @@
           <a:p>
             <a:fld id="{4A66F40E-0BE7-7441-94CB-0CED3EF25F1E}" type="datetimeFigureOut">
               <a:rPr lang="de-DE" smtClean="0"/>
-              <a:t>01.03.22</a:t>
+              <a:t>02.03.22</a:t>
             </a:fld>
             <a:endParaRPr lang="de-DE"/>
           </a:p>
@@ -2435,7 +3540,7 @@
           <a:p>
             <a:fld id="{4A66F40E-0BE7-7441-94CB-0CED3EF25F1E}" type="datetimeFigureOut">
               <a:rPr lang="de-DE" smtClean="0"/>
-              <a:t>01.03.22</a:t>
+              <a:t>02.03.22</a:t>
             </a:fld>
             <a:endParaRPr lang="de-DE"/>
           </a:p>
@@ -2847,7 +3952,7 @@
           <a:p>
             <a:fld id="{4A66F40E-0BE7-7441-94CB-0CED3EF25F1E}" type="datetimeFigureOut">
               <a:rPr lang="de-DE" smtClean="0"/>
-              <a:t>01.03.22</a:t>
+              <a:t>02.03.22</a:t>
             </a:fld>
             <a:endParaRPr lang="de-DE"/>
           </a:p>
@@ -2988,7 +4093,7 @@
           <a:p>
             <a:fld id="{4A66F40E-0BE7-7441-94CB-0CED3EF25F1E}" type="datetimeFigureOut">
               <a:rPr lang="de-DE" smtClean="0"/>
-              <a:t>01.03.22</a:t>
+              <a:t>02.03.22</a:t>
             </a:fld>
             <a:endParaRPr lang="de-DE"/>
           </a:p>
@@ -3101,7 +4206,7 @@
           <a:p>
             <a:fld id="{4A66F40E-0BE7-7441-94CB-0CED3EF25F1E}" type="datetimeFigureOut">
               <a:rPr lang="de-DE" smtClean="0"/>
-              <a:t>01.03.22</a:t>
+              <a:t>02.03.22</a:t>
             </a:fld>
             <a:endParaRPr lang="de-DE"/>
           </a:p>
@@ -3412,7 +4517,7 @@
           <a:p>
             <a:fld id="{4A66F40E-0BE7-7441-94CB-0CED3EF25F1E}" type="datetimeFigureOut">
               <a:rPr lang="de-DE" smtClean="0"/>
-              <a:t>01.03.22</a:t>
+              <a:t>02.03.22</a:t>
             </a:fld>
             <a:endParaRPr lang="de-DE"/>
           </a:p>
@@ -3700,7 +4805,7 @@
           <a:p>
             <a:fld id="{4A66F40E-0BE7-7441-94CB-0CED3EF25F1E}" type="datetimeFigureOut">
               <a:rPr lang="de-DE" smtClean="0"/>
-              <a:t>01.03.22</a:t>
+              <a:t>02.03.22</a:t>
             </a:fld>
             <a:endParaRPr lang="de-DE"/>
           </a:p>
@@ -3941,7 +5046,7 @@
           <a:p>
             <a:fld id="{4A66F40E-0BE7-7441-94CB-0CED3EF25F1E}" type="datetimeFigureOut">
               <a:rPr lang="de-DE" smtClean="0"/>
-              <a:t>01.03.22</a:t>
+              <a:t>02.03.22</a:t>
             </a:fld>
             <a:endParaRPr lang="de-DE"/>
           </a:p>
@@ -4539,6 +5644,2465 @@
 </p:sld>
 </file>
 
+<file path=ppt/slides/slide10.xml><?xml version="1.0" encoding="utf-8"?>
+<p:sld xmlns:a="http://schemas.openxmlformats.org/drawingml/2006/main" xmlns:r="http://schemas.openxmlformats.org/officeDocument/2006/relationships" xmlns:p="http://schemas.openxmlformats.org/presentationml/2006/main">
+  <p:cSld>
+    <p:spTree>
+      <p:nvGrpSpPr>
+        <p:cNvPr id="1" name=""/>
+        <p:cNvGrpSpPr/>
+        <p:nvPr/>
+      </p:nvGrpSpPr>
+      <p:grpSpPr>
+        <a:xfrm>
+          <a:off x="0" y="0"/>
+          <a:ext cx="0" cy="0"/>
+          <a:chOff x="0" y="0"/>
+          <a:chExt cx="0" cy="0"/>
+        </a:xfrm>
+      </p:grpSpPr>
+      <p:sp>
+        <p:nvSpPr>
+          <p:cNvPr id="52" name="Textfeld 51">
+            <a:extLst>
+              <a:ext uri="{FF2B5EF4-FFF2-40B4-BE49-F238E27FC236}">
+                <a16:creationId xmlns:a16="http://schemas.microsoft.com/office/drawing/2014/main" id="{02D46DD5-A467-5A4F-9B9C-C0FBA091B004}"/>
+              </a:ext>
+            </a:extLst>
+          </p:cNvPr>
+          <p:cNvSpPr txBox="1"/>
+          <p:nvPr/>
+        </p:nvSpPr>
+        <p:spPr>
+          <a:xfrm>
+            <a:off x="365769" y="302411"/>
+            <a:ext cx="6674128" cy="461665"/>
+          </a:xfrm>
+          <a:prstGeom prst="rect">
+            <a:avLst/>
+          </a:prstGeom>
+          <a:noFill/>
+        </p:spPr>
+        <p:txBody>
+          <a:bodyPr wrap="square" rtlCol="0">
+            <a:spAutoFit/>
+          </a:bodyPr>
+          <a:lstStyle/>
+          <a:p>
+            <a:r>
+              <a:rPr lang="de-DE" sz="2400" b="1" dirty="0" err="1"/>
+              <a:t>Augmented Dickey-Fuller Test </a:t>
+            </a:r>
+            <a:r>
+              <a:rPr lang="de-DE" sz="2400" dirty="0" err="1"/>
+              <a:t>(ADFT)</a:t>
+            </a:r>
+            <a:endParaRPr lang="de-DE" sz="2400" dirty="0"/>
+          </a:p>
+        </p:txBody>
+      </p:sp>
+      <p:sp>
+        <p:nvSpPr>
+          <p:cNvPr id="2" name="Textfeld 1">
+            <a:extLst>
+              <a:ext uri="{FF2B5EF4-FFF2-40B4-BE49-F238E27FC236}">
+                <a16:creationId xmlns:a16="http://schemas.microsoft.com/office/drawing/2014/main" id="{0563C5AA-9756-DB45-803E-65F1054F2B0F}"/>
+              </a:ext>
+            </a:extLst>
+          </p:cNvPr>
+          <p:cNvSpPr txBox="1"/>
+          <p:nvPr/>
+        </p:nvSpPr>
+        <p:spPr>
+          <a:xfrm>
+            <a:off x="365769" y="1316182"/>
+            <a:ext cx="11687686" cy="2246769"/>
+          </a:xfrm>
+          <a:prstGeom prst="rect">
+            <a:avLst/>
+          </a:prstGeom>
+          <a:noFill/>
+        </p:spPr>
+        <p:txBody>
+          <a:bodyPr wrap="square" rtlCol="0">
+            <a:spAutoFit/>
+          </a:bodyPr>
+          <a:lstStyle/>
+          <a:p>
+            <a:pPr marL="285750" indent="-285750">
+              <a:buFont typeface="Arial" panose="020B0604020202020204" pitchFamily="34" charset="0"/>
+              <a:buChar char="•"/>
+            </a:pPr>
+            <a:r>
+              <a:rPr lang="de-DE" sz="2000" b="1" dirty="0"/>
+              <a:t>Statistical test</a:t>
+            </a:r>
+            <a:r>
+              <a:rPr lang="de-DE" sz="2000" dirty="0"/>
+              <a:t>, called „</a:t>
+            </a:r>
+            <a:r>
+              <a:rPr lang="de-DE" sz="2000" b="1" dirty="0"/>
+              <a:t>unit root</a:t>
+            </a:r>
+            <a:r>
+              <a:rPr lang="de-DE" sz="2000" dirty="0"/>
+              <a:t>“ test.</a:t>
+            </a:r>
+          </a:p>
+          <a:p>
+            <a:pPr marL="285750" indent="-285750">
+              <a:buFont typeface="Arial" panose="020B0604020202020204" pitchFamily="34" charset="0"/>
+              <a:buChar char="•"/>
+            </a:pPr>
+            <a:r>
+              <a:rPr lang="de-DE" sz="2000" dirty="0"/>
+              <a:t>Determines, how strongly a </a:t>
+            </a:r>
+            <a:r>
+              <a:rPr lang="de-DE" sz="2000" b="1" dirty="0"/>
+              <a:t>timeseries is</a:t>
+            </a:r>
+            <a:r>
+              <a:rPr lang="de-DE" sz="2000" dirty="0"/>
+              <a:t> </a:t>
+            </a:r>
+            <a:r>
+              <a:rPr lang="de-DE" sz="2000" b="1" dirty="0"/>
+              <a:t>defined by a trend</a:t>
+            </a:r>
+            <a:r>
+              <a:rPr lang="de-DE" sz="2000" dirty="0"/>
+              <a:t>.</a:t>
+            </a:r>
+          </a:p>
+          <a:p>
+            <a:pPr marL="285750" indent="-285750">
+              <a:buFont typeface="Arial" panose="020B0604020202020204" pitchFamily="34" charset="0"/>
+              <a:buChar char="•"/>
+            </a:pPr>
+            <a:r>
+              <a:rPr lang="de-DE" sz="2000" dirty="0"/>
+              <a:t>Uses an </a:t>
+            </a:r>
+            <a:r>
+              <a:rPr lang="de-DE" sz="2000" b="1" dirty="0"/>
+              <a:t>autoregressive model</a:t>
+            </a:r>
+            <a:r>
+              <a:rPr lang="de-DE" sz="2000" dirty="0"/>
+              <a:t>, optimizes information criterion across multiple different lag values.</a:t>
+            </a:r>
+          </a:p>
+          <a:p>
+            <a:pPr marL="285750" indent="-285750">
+              <a:buFont typeface="Arial" panose="020B0604020202020204" pitchFamily="34" charset="0"/>
+              <a:buChar char="•"/>
+            </a:pPr>
+            <a:r>
+              <a:rPr lang="de-DE" sz="2000" b="1" dirty="0"/>
+              <a:t>Null Hypothesis </a:t>
+            </a:r>
+            <a:r>
+              <a:rPr lang="de-DE" sz="2000" dirty="0"/>
+              <a:t>(H0): Timeseries has unit root, meaning it is </a:t>
+            </a:r>
+            <a:r>
+              <a:rPr lang="de-DE" sz="2000" b="1" dirty="0"/>
+              <a:t>non-stationary</a:t>
+            </a:r>
+            <a:r>
+              <a:rPr lang="de-DE" sz="2000" dirty="0"/>
+              <a:t>, has time dependent structure.</a:t>
+            </a:r>
+          </a:p>
+          <a:p>
+            <a:pPr marL="800100" lvl="1" indent="-342900">
+              <a:buFont typeface="Courier New" panose="02070309020205020404" pitchFamily="49" charset="0"/>
+              <a:buChar char="o"/>
+            </a:pPr>
+            <a:r>
+              <a:rPr lang="de-DE" sz="2000" dirty="0"/>
+              <a:t>Choose </a:t>
+            </a:r>
+            <a:r>
+              <a:rPr lang="de-DE" sz="2000" b="1" dirty="0"/>
+              <a:t>confidence level</a:t>
+            </a:r>
+            <a:r>
+              <a:rPr lang="de-DE" sz="2000" dirty="0"/>
+              <a:t>, e.g. 5%.</a:t>
+            </a:r>
+          </a:p>
+          <a:p>
+            <a:pPr marL="800100" lvl="1" indent="-342900">
+              <a:buFont typeface="Courier New" panose="02070309020205020404" pitchFamily="49" charset="0"/>
+              <a:buChar char="o"/>
+            </a:pPr>
+            <a:r>
+              <a:rPr lang="de-DE" sz="2000" b="1" dirty="0"/>
+              <a:t>p-value</a:t>
+            </a:r>
+            <a:r>
+              <a:rPr lang="de-DE" sz="2000" dirty="0"/>
+              <a:t> &lt; 0.05	</a:t>
+            </a:r>
+            <a:r>
+              <a:rPr lang="de-DE" sz="2000" dirty="0">
+                <a:sym typeface="Wingdings" pitchFamily="2" charset="2"/>
+              </a:rPr>
+              <a:t> reject H0</a:t>
+            </a:r>
+            <a:endParaRPr lang="de-DE" sz="2000" dirty="0"/>
+          </a:p>
+          <a:p>
+            <a:pPr marL="742950" lvl="1" indent="-285750">
+              <a:buFont typeface="Arial" panose="020B0604020202020204" pitchFamily="34" charset="0"/>
+              <a:buChar char="•"/>
+            </a:pPr>
+            <a:endParaRPr lang="de-DE" sz="2000" dirty="0"/>
+          </a:p>
+        </p:txBody>
+      </p:sp>
+      <p:pic>
+        <p:nvPicPr>
+          <p:cNvPr id="3" name="Grafik 2">
+            <a:extLst>
+              <a:ext uri="{FF2B5EF4-FFF2-40B4-BE49-F238E27FC236}">
+                <a16:creationId xmlns:a16="http://schemas.microsoft.com/office/drawing/2014/main" id="{4DCACDF9-3621-7243-9DE6-DC86C7A87E05}"/>
+              </a:ext>
+            </a:extLst>
+          </p:cNvPr>
+          <p:cNvPicPr>
+            <a:picLocks noChangeAspect="1"/>
+          </p:cNvPicPr>
+          <p:nvPr/>
+        </p:nvPicPr>
+        <p:blipFill>
+          <a:blip r:embed="rId3"/>
+          <a:stretch>
+            <a:fillRect/>
+          </a:stretch>
+        </p:blipFill>
+        <p:spPr>
+          <a:xfrm>
+            <a:off x="138545" y="4522230"/>
+            <a:ext cx="12014200" cy="1397000"/>
+          </a:xfrm>
+          <a:prstGeom prst="rect">
+            <a:avLst/>
+          </a:prstGeom>
+        </p:spPr>
+      </p:pic>
+    </p:spTree>
+    <p:extLst>
+      <p:ext uri="{BB962C8B-B14F-4D97-AF65-F5344CB8AC3E}">
+        <p14:creationId xmlns:p14="http://schemas.microsoft.com/office/powerpoint/2010/main" val="1140051206"/>
+      </p:ext>
+    </p:extLst>
+  </p:cSld>
+  <p:clrMapOvr>
+    <a:masterClrMapping/>
+  </p:clrMapOvr>
+</p:sld>
+</file>
+
+<file path=ppt/slides/slide11.xml><?xml version="1.0" encoding="utf-8"?>
+<p:sld xmlns:a="http://schemas.openxmlformats.org/drawingml/2006/main" xmlns:r="http://schemas.openxmlformats.org/officeDocument/2006/relationships" xmlns:p="http://schemas.openxmlformats.org/presentationml/2006/main">
+  <p:cSld>
+    <p:spTree>
+      <p:nvGrpSpPr>
+        <p:cNvPr id="1" name=""/>
+        <p:cNvGrpSpPr/>
+        <p:nvPr/>
+      </p:nvGrpSpPr>
+      <p:grpSpPr>
+        <a:xfrm>
+          <a:off x="0" y="0"/>
+          <a:ext cx="0" cy="0"/>
+          <a:chOff x="0" y="0"/>
+          <a:chExt cx="0" cy="0"/>
+        </a:xfrm>
+      </p:grpSpPr>
+      <p:sp>
+        <p:nvSpPr>
+          <p:cNvPr id="52" name="Textfeld 51">
+            <a:extLst>
+              <a:ext uri="{FF2B5EF4-FFF2-40B4-BE49-F238E27FC236}">
+                <a16:creationId xmlns:a16="http://schemas.microsoft.com/office/drawing/2014/main" id="{02D46DD5-A467-5A4F-9B9C-C0FBA091B004}"/>
+              </a:ext>
+            </a:extLst>
+          </p:cNvPr>
+          <p:cNvSpPr txBox="1"/>
+          <p:nvPr/>
+        </p:nvSpPr>
+        <p:spPr>
+          <a:xfrm>
+            <a:off x="365769" y="302411"/>
+            <a:ext cx="6674128" cy="461665"/>
+          </a:xfrm>
+          <a:prstGeom prst="rect">
+            <a:avLst/>
+          </a:prstGeom>
+          <a:noFill/>
+        </p:spPr>
+        <p:txBody>
+          <a:bodyPr wrap="square" rtlCol="0">
+            <a:spAutoFit/>
+          </a:bodyPr>
+          <a:lstStyle/>
+          <a:p>
+            <a:r>
+              <a:rPr lang="de-DE" sz="2400" b="1" dirty="0" err="1"/>
+              <a:t>Augmented Dickey-Fuller Test </a:t>
+            </a:r>
+            <a:r>
+              <a:rPr lang="de-DE" sz="2400" dirty="0" err="1"/>
+              <a:t>(ADFT)</a:t>
+            </a:r>
+            <a:endParaRPr lang="de-DE" sz="2400" dirty="0"/>
+          </a:p>
+        </p:txBody>
+      </p:sp>
+      <p:pic>
+        <p:nvPicPr>
+          <p:cNvPr id="5" name="Picture 4">
+            <a:extLst>
+              <a:ext uri="{FF2B5EF4-FFF2-40B4-BE49-F238E27FC236}">
+                <a16:creationId xmlns:a16="http://schemas.microsoft.com/office/drawing/2014/main" id="{B4DD172A-D112-F044-A19B-D501B2BF2FB1}"/>
+              </a:ext>
+            </a:extLst>
+          </p:cNvPr>
+          <p:cNvPicPr>
+            <a:picLocks noChangeAspect="1" noChangeArrowheads="1"/>
+          </p:cNvPicPr>
+          <p:nvPr/>
+        </p:nvPicPr>
+        <p:blipFill>
+          <a:blip r:embed="rId3">
+            <a:extLst>
+              <a:ext uri="{28A0092B-C50C-407E-A947-70E740481C1C}">
+                <a14:useLocalDpi xmlns:a14="http://schemas.microsoft.com/office/drawing/2010/main" val="0"/>
+              </a:ext>
+            </a:extLst>
+          </a:blip>
+          <a:srcRect/>
+          <a:stretch>
+            <a:fillRect/>
+          </a:stretch>
+        </p:blipFill>
+        <p:spPr bwMode="auto">
+          <a:xfrm>
+            <a:off x="89210" y="1106964"/>
+            <a:ext cx="9373529" cy="4055655"/>
+          </a:xfrm>
+          <a:prstGeom prst="rect">
+            <a:avLst/>
+          </a:prstGeom>
+          <a:noFill/>
+          <a:extLst>
+            <a:ext uri="{909E8E84-426E-40DD-AFC4-6F175D3DCCD1}">
+              <a14:hiddenFill xmlns:a14="http://schemas.microsoft.com/office/drawing/2010/main">
+                <a:solidFill>
+                  <a:srgbClr val="FFFFFF"/>
+                </a:solidFill>
+              </a14:hiddenFill>
+            </a:ext>
+          </a:extLst>
+        </p:spPr>
+      </p:pic>
+      <p:sp>
+        <p:nvSpPr>
+          <p:cNvPr id="6" name="Oval 5">
+            <a:extLst>
+              <a:ext uri="{FF2B5EF4-FFF2-40B4-BE49-F238E27FC236}">
+                <a16:creationId xmlns:a16="http://schemas.microsoft.com/office/drawing/2014/main" id="{2DAC9686-A499-D647-9BC0-EC2FB383F96A}"/>
+              </a:ext>
+            </a:extLst>
+          </p:cNvPr>
+          <p:cNvSpPr/>
+          <p:nvPr/>
+        </p:nvSpPr>
+        <p:spPr>
+          <a:xfrm>
+            <a:off x="2999679" y="3178098"/>
+            <a:ext cx="2274848" cy="1739589"/>
+          </a:xfrm>
+          <a:prstGeom prst="ellipse">
+            <a:avLst/>
+          </a:prstGeom>
+          <a:solidFill>
+            <a:srgbClr val="C00000">
+              <a:alpha val="10000"/>
+            </a:srgbClr>
+          </a:solidFill>
+          <a:ln w="25400">
+            <a:solidFill>
+              <a:srgbClr val="C00000"/>
+            </a:solidFill>
+            <a:prstDash val="sysDot"/>
+          </a:ln>
+        </p:spPr>
+        <p:style>
+          <a:lnRef idx="2">
+            <a:schemeClr val="accent1">
+              <a:shade val="50000"/>
+            </a:schemeClr>
+          </a:lnRef>
+          <a:fillRef idx="1">
+            <a:schemeClr val="accent1"/>
+          </a:fillRef>
+          <a:effectRef idx="0">
+            <a:schemeClr val="accent1"/>
+          </a:effectRef>
+          <a:fontRef idx="minor">
+            <a:schemeClr val="lt1"/>
+          </a:fontRef>
+        </p:style>
+        <p:txBody>
+          <a:bodyPr rtlCol="0" anchor="ctr"/>
+          <a:lstStyle/>
+          <a:p>
+            <a:pPr algn="ctr"/>
+            <a:endParaRPr lang="de-DE"/>
+          </a:p>
+        </p:txBody>
+      </p:sp>
+      <p:pic>
+        <p:nvPicPr>
+          <p:cNvPr id="7" name="Grafik 6">
+            <a:extLst>
+              <a:ext uri="{FF2B5EF4-FFF2-40B4-BE49-F238E27FC236}">
+                <a16:creationId xmlns:a16="http://schemas.microsoft.com/office/drawing/2014/main" id="{11BCBC55-6BBE-0845-9FF8-A4D0C31E804D}"/>
+              </a:ext>
+            </a:extLst>
+          </p:cNvPr>
+          <p:cNvPicPr>
+            <a:picLocks noChangeAspect="1"/>
+          </p:cNvPicPr>
+          <p:nvPr/>
+        </p:nvPicPr>
+        <p:blipFill>
+          <a:blip r:embed="rId4"/>
+          <a:stretch>
+            <a:fillRect/>
+          </a:stretch>
+        </p:blipFill>
+        <p:spPr>
+          <a:xfrm>
+            <a:off x="8227122" y="3624146"/>
+            <a:ext cx="3454400" cy="2641600"/>
+          </a:xfrm>
+          <a:prstGeom prst="rect">
+            <a:avLst/>
+          </a:prstGeom>
+          <a:ln>
+            <a:solidFill>
+              <a:schemeClr val="tx1"/>
+            </a:solidFill>
+          </a:ln>
+        </p:spPr>
+      </p:pic>
+      <p:sp>
+        <p:nvSpPr>
+          <p:cNvPr id="9" name="Textfeld 8">
+            <a:extLst>
+              <a:ext uri="{FF2B5EF4-FFF2-40B4-BE49-F238E27FC236}">
+                <a16:creationId xmlns:a16="http://schemas.microsoft.com/office/drawing/2014/main" id="{33BE9BC9-50C3-AB40-826C-E03E43C99755}"/>
+              </a:ext>
+            </a:extLst>
+          </p:cNvPr>
+          <p:cNvSpPr txBox="1"/>
+          <p:nvPr/>
+        </p:nvSpPr>
+        <p:spPr>
+          <a:xfrm>
+            <a:off x="215916" y="5505111"/>
+            <a:ext cx="6973833" cy="1015663"/>
+          </a:xfrm>
+          <a:prstGeom prst="rect">
+            <a:avLst/>
+          </a:prstGeom>
+          <a:noFill/>
+        </p:spPr>
+        <p:txBody>
+          <a:bodyPr wrap="square" rtlCol="0">
+            <a:spAutoFit/>
+          </a:bodyPr>
+          <a:lstStyle/>
+          <a:p>
+            <a:pPr lvl="1"/>
+            <a:r>
+              <a:rPr lang="de-DE" sz="2000" dirty="0">
+                <a:sym typeface="Wingdings" pitchFamily="2" charset="2"/>
+              </a:rPr>
+              <a:t> ADFT indicates </a:t>
+            </a:r>
+            <a:r>
+              <a:rPr lang="de-DE" sz="2000" b="1" dirty="0">
+                <a:sym typeface="Wingdings" pitchFamily="2" charset="2"/>
+              </a:rPr>
+              <a:t>SP500_rel_chg</a:t>
+            </a:r>
+            <a:r>
+              <a:rPr lang="de-DE" sz="2000" dirty="0">
+                <a:sym typeface="Wingdings" pitchFamily="2" charset="2"/>
+              </a:rPr>
+              <a:t> to be </a:t>
+            </a:r>
+            <a:r>
+              <a:rPr lang="de-DE" sz="2000" b="1" dirty="0">
+                <a:sym typeface="Wingdings" pitchFamily="2" charset="2"/>
+              </a:rPr>
+              <a:t>stationary</a:t>
+            </a:r>
+            <a:r>
+              <a:rPr lang="de-DE" sz="2000" dirty="0">
+                <a:sym typeface="Wingdings" pitchFamily="2" charset="2"/>
+              </a:rPr>
+              <a:t>, at least in terms of having „</a:t>
+            </a:r>
+            <a:r>
+              <a:rPr lang="de-DE" sz="2000" b="1" dirty="0">
+                <a:sym typeface="Wingdings" pitchFamily="2" charset="2"/>
+              </a:rPr>
+              <a:t>no trend</a:t>
+            </a:r>
+            <a:r>
+              <a:rPr lang="de-DE" sz="2000" dirty="0">
+                <a:sym typeface="Wingdings" pitchFamily="2" charset="2"/>
+              </a:rPr>
+              <a:t>“.</a:t>
+            </a:r>
+          </a:p>
+          <a:p>
+            <a:pPr lvl="1"/>
+            <a:r>
+              <a:rPr lang="de-DE" sz="2000" dirty="0">
+                <a:sym typeface="Wingdings" pitchFamily="2" charset="2"/>
+              </a:rPr>
+              <a:t>However, still non-stationary, since </a:t>
+            </a:r>
+            <a:r>
+              <a:rPr lang="de-DE" sz="2000" b="1" dirty="0">
+                <a:sym typeface="Wingdings" pitchFamily="2" charset="2"/>
+              </a:rPr>
+              <a:t>variance</a:t>
+            </a:r>
+            <a:r>
+              <a:rPr lang="de-DE" sz="2000" dirty="0">
+                <a:sym typeface="Wingdings" pitchFamily="2" charset="2"/>
+              </a:rPr>
+              <a:t> varies over time!</a:t>
+            </a:r>
+            <a:endParaRPr lang="de-DE" sz="2000" dirty="0"/>
+          </a:p>
+        </p:txBody>
+      </p:sp>
+    </p:spTree>
+    <p:extLst>
+      <p:ext uri="{BB962C8B-B14F-4D97-AF65-F5344CB8AC3E}">
+        <p14:creationId xmlns:p14="http://schemas.microsoft.com/office/powerpoint/2010/main" val="3521582897"/>
+      </p:ext>
+    </p:extLst>
+  </p:cSld>
+  <p:clrMapOvr>
+    <a:masterClrMapping/>
+  </p:clrMapOvr>
+</p:sld>
+</file>
+
+<file path=ppt/slides/slide12.xml><?xml version="1.0" encoding="utf-8"?>
+<p:sld xmlns:a="http://schemas.openxmlformats.org/drawingml/2006/main" xmlns:r="http://schemas.openxmlformats.org/officeDocument/2006/relationships" xmlns:p="http://schemas.openxmlformats.org/presentationml/2006/main">
+  <p:cSld>
+    <p:spTree>
+      <p:nvGrpSpPr>
+        <p:cNvPr id="1" name=""/>
+        <p:cNvGrpSpPr/>
+        <p:nvPr/>
+      </p:nvGrpSpPr>
+      <p:grpSpPr>
+        <a:xfrm>
+          <a:off x="0" y="0"/>
+          <a:ext cx="0" cy="0"/>
+          <a:chOff x="0" y="0"/>
+          <a:chExt cx="0" cy="0"/>
+        </a:xfrm>
+      </p:grpSpPr>
+      <p:sp>
+        <p:nvSpPr>
+          <p:cNvPr id="52" name="Textfeld 51">
+            <a:extLst>
+              <a:ext uri="{FF2B5EF4-FFF2-40B4-BE49-F238E27FC236}">
+                <a16:creationId xmlns:a16="http://schemas.microsoft.com/office/drawing/2014/main" id="{02D46DD5-A467-5A4F-9B9C-C0FBA091B004}"/>
+              </a:ext>
+            </a:extLst>
+          </p:cNvPr>
+          <p:cNvSpPr txBox="1"/>
+          <p:nvPr/>
+        </p:nvSpPr>
+        <p:spPr>
+          <a:xfrm>
+            <a:off x="365769" y="302411"/>
+            <a:ext cx="6674128" cy="461665"/>
+          </a:xfrm>
+          <a:prstGeom prst="rect">
+            <a:avLst/>
+          </a:prstGeom>
+          <a:noFill/>
+        </p:spPr>
+        <p:txBody>
+          <a:bodyPr wrap="square" rtlCol="0">
+            <a:spAutoFit/>
+          </a:bodyPr>
+          <a:lstStyle/>
+          <a:p>
+            <a:r>
+              <a:rPr lang="de-DE" sz="2400" b="1" dirty="0" err="1"/>
+              <a:t>Additive decomposition of timeseries</a:t>
+            </a:r>
+            <a:endParaRPr lang="de-DE" sz="2400" b="1" dirty="0"/>
+          </a:p>
+        </p:txBody>
+      </p:sp>
+      <p:pic>
+        <p:nvPicPr>
+          <p:cNvPr id="3" name="Grafik 2">
+            <a:extLst>
+              <a:ext uri="{FF2B5EF4-FFF2-40B4-BE49-F238E27FC236}">
+                <a16:creationId xmlns:a16="http://schemas.microsoft.com/office/drawing/2014/main" id="{09A6A5D8-D024-D349-A7D8-212663990290}"/>
+              </a:ext>
+            </a:extLst>
+          </p:cNvPr>
+          <p:cNvPicPr>
+            <a:picLocks noChangeAspect="1"/>
+          </p:cNvPicPr>
+          <p:nvPr/>
+        </p:nvPicPr>
+        <p:blipFill>
+          <a:blip r:embed="rId3"/>
+          <a:stretch>
+            <a:fillRect/>
+          </a:stretch>
+        </p:blipFill>
+        <p:spPr>
+          <a:xfrm>
+            <a:off x="250057" y="1454953"/>
+            <a:ext cx="11328400" cy="2794000"/>
+          </a:xfrm>
+          <a:prstGeom prst="rect">
+            <a:avLst/>
+          </a:prstGeom>
+        </p:spPr>
+      </p:pic>
+      <p:sp>
+        <p:nvSpPr>
+          <p:cNvPr id="4" name="Rechteck 3">
+            <a:extLst>
+              <a:ext uri="{FF2B5EF4-FFF2-40B4-BE49-F238E27FC236}">
+                <a16:creationId xmlns:a16="http://schemas.microsoft.com/office/drawing/2014/main" id="{7489E46E-4365-334F-BDDC-78681DD4F8D0}"/>
+              </a:ext>
+            </a:extLst>
+          </p:cNvPr>
+          <p:cNvSpPr/>
+          <p:nvPr/>
+        </p:nvSpPr>
+        <p:spPr>
+          <a:xfrm>
+            <a:off x="3902927" y="2207941"/>
+            <a:ext cx="4137102" cy="1059366"/>
+          </a:xfrm>
+          <a:prstGeom prst="rect">
+            <a:avLst/>
+          </a:prstGeom>
+          <a:solidFill>
+            <a:schemeClr val="bg1">
+              <a:lumMod val="65000"/>
+              <a:alpha val="20000"/>
+            </a:schemeClr>
+          </a:solidFill>
+          <a:ln w="19050">
+            <a:solidFill>
+              <a:schemeClr val="tx1"/>
+            </a:solidFill>
+          </a:ln>
+        </p:spPr>
+        <p:style>
+          <a:lnRef idx="2">
+            <a:schemeClr val="accent1">
+              <a:shade val="50000"/>
+            </a:schemeClr>
+          </a:lnRef>
+          <a:fillRef idx="1">
+            <a:schemeClr val="accent1"/>
+          </a:fillRef>
+          <a:effectRef idx="0">
+            <a:schemeClr val="accent1"/>
+          </a:effectRef>
+          <a:fontRef idx="minor">
+            <a:schemeClr val="lt1"/>
+          </a:fontRef>
+        </p:style>
+        <p:txBody>
+          <a:bodyPr rtlCol="0" anchor="ctr"/>
+          <a:lstStyle/>
+          <a:p>
+            <a:pPr algn="ctr"/>
+            <a:endParaRPr lang="de-DE"/>
+          </a:p>
+        </p:txBody>
+      </p:sp>
+    </p:spTree>
+    <p:extLst>
+      <p:ext uri="{BB962C8B-B14F-4D97-AF65-F5344CB8AC3E}">
+        <p14:creationId xmlns:p14="http://schemas.microsoft.com/office/powerpoint/2010/main" val="633952206"/>
+      </p:ext>
+    </p:extLst>
+  </p:cSld>
+  <p:clrMapOvr>
+    <a:masterClrMapping/>
+  </p:clrMapOvr>
+</p:sld>
+</file>
+
+<file path=ppt/slides/slide13.xml><?xml version="1.0" encoding="utf-8"?>
+<p:sld xmlns:a="http://schemas.openxmlformats.org/drawingml/2006/main" xmlns:r="http://schemas.openxmlformats.org/officeDocument/2006/relationships" xmlns:p="http://schemas.openxmlformats.org/presentationml/2006/main">
+  <p:cSld>
+    <p:spTree>
+      <p:nvGrpSpPr>
+        <p:cNvPr id="1" name=""/>
+        <p:cNvGrpSpPr/>
+        <p:nvPr/>
+      </p:nvGrpSpPr>
+      <p:grpSpPr>
+        <a:xfrm>
+          <a:off x="0" y="0"/>
+          <a:ext cx="0" cy="0"/>
+          <a:chOff x="0" y="0"/>
+          <a:chExt cx="0" cy="0"/>
+        </a:xfrm>
+      </p:grpSpPr>
+      <p:sp>
+        <p:nvSpPr>
+          <p:cNvPr id="52" name="Textfeld 51">
+            <a:extLst>
+              <a:ext uri="{FF2B5EF4-FFF2-40B4-BE49-F238E27FC236}">
+                <a16:creationId xmlns:a16="http://schemas.microsoft.com/office/drawing/2014/main" id="{02D46DD5-A467-5A4F-9B9C-C0FBA091B004}"/>
+              </a:ext>
+            </a:extLst>
+          </p:cNvPr>
+          <p:cNvSpPr txBox="1"/>
+          <p:nvPr/>
+        </p:nvSpPr>
+        <p:spPr>
+          <a:xfrm>
+            <a:off x="365769" y="302411"/>
+            <a:ext cx="6674128" cy="769441"/>
+          </a:xfrm>
+          <a:prstGeom prst="rect">
+            <a:avLst/>
+          </a:prstGeom>
+          <a:noFill/>
+        </p:spPr>
+        <p:txBody>
+          <a:bodyPr wrap="square" rtlCol="0">
+            <a:spAutoFit/>
+          </a:bodyPr>
+          <a:lstStyle/>
+          <a:p>
+            <a:r>
+              <a:rPr lang="de-DE" sz="2400" dirty="0" err="1"/>
+              <a:t>Additive decomposition: </a:t>
+            </a:r>
+            <a:r>
+              <a:rPr lang="de-DE" sz="2400" b="1" dirty="0" err="1"/>
+              <a:t>SP500</a:t>
+            </a:r>
+          </a:p>
+          <a:p>
+            <a:r>
+              <a:rPr lang="de-DE" sz="2000" dirty="0" err="1"/>
+              <a:t>(scaled absolute values)</a:t>
+            </a:r>
+            <a:endParaRPr lang="de-DE" sz="2000" dirty="0"/>
+          </a:p>
+        </p:txBody>
+      </p:sp>
+      <p:pic>
+        <p:nvPicPr>
+          <p:cNvPr id="1026" name="Picture 2">
+            <a:extLst>
+              <a:ext uri="{FF2B5EF4-FFF2-40B4-BE49-F238E27FC236}">
+                <a16:creationId xmlns:a16="http://schemas.microsoft.com/office/drawing/2014/main" id="{94868CD5-1725-FC4D-98D3-96884D2E54FB}"/>
+              </a:ext>
+            </a:extLst>
+          </p:cNvPr>
+          <p:cNvPicPr>
+            <a:picLocks noChangeAspect="1" noChangeArrowheads="1"/>
+          </p:cNvPicPr>
+          <p:nvPr/>
+        </p:nvPicPr>
+        <p:blipFill>
+          <a:blip r:embed="rId3">
+            <a:extLst>
+              <a:ext uri="{28A0092B-C50C-407E-A947-70E740481C1C}">
+                <a14:useLocalDpi xmlns:a14="http://schemas.microsoft.com/office/drawing/2010/main" val="0"/>
+              </a:ext>
+            </a:extLst>
+          </a:blip>
+          <a:srcRect/>
+          <a:stretch>
+            <a:fillRect/>
+          </a:stretch>
+        </p:blipFill>
+        <p:spPr bwMode="auto">
+          <a:xfrm>
+            <a:off x="4994475" y="-34723"/>
+            <a:ext cx="7162800" cy="6858000"/>
+          </a:xfrm>
+          <a:prstGeom prst="rect">
+            <a:avLst/>
+          </a:prstGeom>
+          <a:noFill/>
+          <a:extLst>
+            <a:ext uri="{909E8E84-426E-40DD-AFC4-6F175D3DCCD1}">
+              <a14:hiddenFill xmlns:a14="http://schemas.microsoft.com/office/drawing/2010/main">
+                <a:solidFill>
+                  <a:srgbClr val="FFFFFF"/>
+                </a:solidFill>
+              </a14:hiddenFill>
+            </a:ext>
+          </a:extLst>
+        </p:spPr>
+      </p:pic>
+      <p:pic>
+        <p:nvPicPr>
+          <p:cNvPr id="5" name="Grafik 4">
+            <a:extLst>
+              <a:ext uri="{FF2B5EF4-FFF2-40B4-BE49-F238E27FC236}">
+                <a16:creationId xmlns:a16="http://schemas.microsoft.com/office/drawing/2014/main" id="{95A87972-F874-0041-AEDE-A55D1C338FFC}"/>
+              </a:ext>
+            </a:extLst>
+          </p:cNvPr>
+          <p:cNvPicPr>
+            <a:picLocks noChangeAspect="1"/>
+          </p:cNvPicPr>
+          <p:nvPr/>
+        </p:nvPicPr>
+        <p:blipFill>
+          <a:blip r:embed="rId4"/>
+          <a:stretch>
+            <a:fillRect/>
+          </a:stretch>
+        </p:blipFill>
+        <p:spPr>
+          <a:xfrm>
+            <a:off x="1226333" y="1240106"/>
+            <a:ext cx="2476500" cy="3543300"/>
+          </a:xfrm>
+          <a:prstGeom prst="rect">
+            <a:avLst/>
+          </a:prstGeom>
+        </p:spPr>
+      </p:pic>
+      <p:sp>
+        <p:nvSpPr>
+          <p:cNvPr id="8" name="Textfeld 7">
+            <a:extLst>
+              <a:ext uri="{FF2B5EF4-FFF2-40B4-BE49-F238E27FC236}">
+                <a16:creationId xmlns:a16="http://schemas.microsoft.com/office/drawing/2014/main" id="{EAA23B28-D537-3D43-B5FA-16F5534CD6F2}"/>
+              </a:ext>
+            </a:extLst>
+          </p:cNvPr>
+          <p:cNvSpPr txBox="1"/>
+          <p:nvPr/>
+        </p:nvSpPr>
+        <p:spPr>
+          <a:xfrm>
+            <a:off x="365769" y="5062669"/>
+            <a:ext cx="4403001" cy="1631216"/>
+          </a:xfrm>
+          <a:prstGeom prst="rect">
+            <a:avLst/>
+          </a:prstGeom>
+          <a:noFill/>
+        </p:spPr>
+        <p:txBody>
+          <a:bodyPr wrap="square" rtlCol="0">
+            <a:spAutoFit/>
+          </a:bodyPr>
+          <a:lstStyle/>
+          <a:p>
+            <a:r>
+              <a:rPr lang="de-DE" sz="2000" dirty="0"/>
+              <a:t>Got smoothing parameters (alpha, gamma) and cycle length (s) from </a:t>
+            </a:r>
+            <a:r>
+              <a:rPr lang="de-DE" sz="2000" b="1" dirty="0"/>
+              <a:t>gridsearch optimization</a:t>
+            </a:r>
+            <a:r>
+              <a:rPr lang="de-DE" sz="2000" dirty="0"/>
+              <a:t>, searching lowest p-values for S and R:</a:t>
+            </a:r>
+          </a:p>
+          <a:p>
+            <a:r>
+              <a:rPr lang="de-DE" sz="2000" dirty="0"/>
+              <a:t>alpha = gamma = 0.01, s = 126</a:t>
+            </a:r>
+          </a:p>
+        </p:txBody>
+      </p:sp>
+      <p:sp>
+        <p:nvSpPr>
+          <p:cNvPr id="6" name="Textfeld 5">
+            <a:extLst>
+              <a:ext uri="{FF2B5EF4-FFF2-40B4-BE49-F238E27FC236}">
+                <a16:creationId xmlns:a16="http://schemas.microsoft.com/office/drawing/2014/main" id="{3A57C701-2723-1842-B2B3-91C3BAFEF2E1}"/>
+              </a:ext>
+            </a:extLst>
+          </p:cNvPr>
+          <p:cNvSpPr txBox="1"/>
+          <p:nvPr/>
+        </p:nvSpPr>
+        <p:spPr>
+          <a:xfrm>
+            <a:off x="6096000" y="3692324"/>
+            <a:ext cx="1959980" cy="369332"/>
+          </a:xfrm>
+          <a:prstGeom prst="rect">
+            <a:avLst/>
+          </a:prstGeom>
+          <a:noFill/>
+        </p:spPr>
+        <p:txBody>
+          <a:bodyPr wrap="square" rtlCol="0">
+            <a:spAutoFit/>
+          </a:bodyPr>
+          <a:lstStyle/>
+          <a:p>
+            <a:r>
+              <a:rPr lang="de-DE">
+                <a:solidFill>
+                  <a:srgbClr val="FF0000"/>
+                </a:solidFill>
+                <a:sym typeface="Wingdings" pitchFamily="2" charset="2"/>
+              </a:rPr>
+              <a:t> Artefact!</a:t>
+            </a:r>
+            <a:endParaRPr lang="de-DE">
+              <a:solidFill>
+                <a:srgbClr val="FF0000"/>
+              </a:solidFill>
+            </a:endParaRPr>
+          </a:p>
+        </p:txBody>
+      </p:sp>
+    </p:spTree>
+    <p:extLst>
+      <p:ext uri="{BB962C8B-B14F-4D97-AF65-F5344CB8AC3E}">
+        <p14:creationId xmlns:p14="http://schemas.microsoft.com/office/powerpoint/2010/main" val="1385818459"/>
+      </p:ext>
+    </p:extLst>
+  </p:cSld>
+  <p:clrMapOvr>
+    <a:masterClrMapping/>
+  </p:clrMapOvr>
+</p:sld>
+</file>
+
+<file path=ppt/slides/slide14.xml><?xml version="1.0" encoding="utf-8"?>
+<p:sld xmlns:a="http://schemas.openxmlformats.org/drawingml/2006/main" xmlns:r="http://schemas.openxmlformats.org/officeDocument/2006/relationships" xmlns:p="http://schemas.openxmlformats.org/presentationml/2006/main">
+  <p:cSld>
+    <p:spTree>
+      <p:nvGrpSpPr>
+        <p:cNvPr id="1" name=""/>
+        <p:cNvGrpSpPr/>
+        <p:nvPr/>
+      </p:nvGrpSpPr>
+      <p:grpSpPr>
+        <a:xfrm>
+          <a:off x="0" y="0"/>
+          <a:ext cx="0" cy="0"/>
+          <a:chOff x="0" y="0"/>
+          <a:chExt cx="0" cy="0"/>
+        </a:xfrm>
+      </p:grpSpPr>
+      <p:sp>
+        <p:nvSpPr>
+          <p:cNvPr id="52" name="Textfeld 51">
+            <a:extLst>
+              <a:ext uri="{FF2B5EF4-FFF2-40B4-BE49-F238E27FC236}">
+                <a16:creationId xmlns:a16="http://schemas.microsoft.com/office/drawing/2014/main" id="{02D46DD5-A467-5A4F-9B9C-C0FBA091B004}"/>
+              </a:ext>
+            </a:extLst>
+          </p:cNvPr>
+          <p:cNvSpPr txBox="1"/>
+          <p:nvPr/>
+        </p:nvSpPr>
+        <p:spPr>
+          <a:xfrm>
+            <a:off x="365769" y="302411"/>
+            <a:ext cx="6674128" cy="769441"/>
+          </a:xfrm>
+          <a:prstGeom prst="rect">
+            <a:avLst/>
+          </a:prstGeom>
+          <a:noFill/>
+        </p:spPr>
+        <p:txBody>
+          <a:bodyPr wrap="square" rtlCol="0">
+            <a:spAutoFit/>
+          </a:bodyPr>
+          <a:lstStyle/>
+          <a:p>
+            <a:r>
+              <a:rPr lang="de-DE" sz="2400" dirty="0" err="1"/>
+              <a:t>Additive decomposition: </a:t>
+            </a:r>
+            <a:r>
+              <a:rPr lang="de-DE" sz="2400" b="1" dirty="0" err="1"/>
+              <a:t>SP500</a:t>
+            </a:r>
+          </a:p>
+          <a:p>
+            <a:r>
+              <a:rPr lang="de-DE" sz="2000" dirty="0" err="1"/>
+              <a:t>(scaled absolute values)</a:t>
+            </a:r>
+            <a:endParaRPr lang="de-DE" sz="2000" dirty="0"/>
+          </a:p>
+        </p:txBody>
+      </p:sp>
+      <p:sp>
+        <p:nvSpPr>
+          <p:cNvPr id="8" name="Textfeld 7">
+            <a:extLst>
+              <a:ext uri="{FF2B5EF4-FFF2-40B4-BE49-F238E27FC236}">
+                <a16:creationId xmlns:a16="http://schemas.microsoft.com/office/drawing/2014/main" id="{EAA23B28-D537-3D43-B5FA-16F5534CD6F2}"/>
+              </a:ext>
+            </a:extLst>
+          </p:cNvPr>
+          <p:cNvSpPr txBox="1"/>
+          <p:nvPr/>
+        </p:nvSpPr>
+        <p:spPr>
+          <a:xfrm>
+            <a:off x="365768" y="1358770"/>
+            <a:ext cx="7528165" cy="2246769"/>
+          </a:xfrm>
+          <a:prstGeom prst="rect">
+            <a:avLst/>
+          </a:prstGeom>
+          <a:noFill/>
+        </p:spPr>
+        <p:txBody>
+          <a:bodyPr wrap="square" rtlCol="0">
+            <a:spAutoFit/>
+          </a:bodyPr>
+          <a:lstStyle/>
+          <a:p>
+            <a:pPr marL="342900" indent="-342900">
+              <a:buFont typeface="Arial" panose="020B0604020202020204" pitchFamily="34" charset="0"/>
+              <a:buChar char="•"/>
+            </a:pPr>
+            <a:r>
+              <a:rPr lang="de-DE" sz="2000" dirty="0"/>
+              <a:t>Find </a:t>
+            </a:r>
+            <a:r>
+              <a:rPr lang="de-DE" sz="2000" b="1" dirty="0"/>
+              <a:t>original series</a:t>
+            </a:r>
+            <a:r>
+              <a:rPr lang="de-DE" sz="2000" dirty="0"/>
+              <a:t> and </a:t>
+            </a:r>
+            <a:r>
+              <a:rPr lang="de-DE" sz="2000" b="1" dirty="0"/>
+              <a:t>trend L</a:t>
+            </a:r>
+            <a:r>
+              <a:rPr lang="de-DE" sz="2000" dirty="0"/>
+              <a:t> with </a:t>
+            </a:r>
+            <a:r>
+              <a:rPr lang="de-DE" sz="2000" b="1" dirty="0"/>
+              <a:t>p-value = 1</a:t>
+            </a:r>
+            <a:r>
+              <a:rPr lang="de-DE" sz="2000" dirty="0"/>
+              <a:t>.</a:t>
+            </a:r>
+          </a:p>
+          <a:p>
+            <a:pPr marL="342900" indent="-342900">
+              <a:buFont typeface="Arial" panose="020B0604020202020204" pitchFamily="34" charset="0"/>
+              <a:buChar char="•"/>
+            </a:pPr>
+            <a:r>
+              <a:rPr lang="de-DE" sz="2000" dirty="0"/>
+              <a:t>Find </a:t>
+            </a:r>
+            <a:r>
+              <a:rPr lang="de-DE" sz="2000" b="1" dirty="0"/>
+              <a:t>season S</a:t>
+            </a:r>
+            <a:r>
+              <a:rPr lang="de-DE" sz="2000" dirty="0"/>
+              <a:t> and </a:t>
+            </a:r>
+            <a:r>
+              <a:rPr lang="de-DE" sz="2000" b="1" dirty="0"/>
+              <a:t>residuum R</a:t>
+            </a:r>
+            <a:r>
+              <a:rPr lang="de-DE" sz="2000" dirty="0"/>
+              <a:t> with </a:t>
+            </a:r>
+            <a:r>
+              <a:rPr lang="de-DE" sz="2000" b="1" dirty="0"/>
+              <a:t>p-value =</a:t>
+            </a:r>
+            <a:r>
+              <a:rPr lang="de-DE" sz="2000" b="1" dirty="0">
+                <a:sym typeface="Wingdings" pitchFamily="2" charset="2"/>
+              </a:rPr>
+              <a:t> 0</a:t>
+            </a:r>
+          </a:p>
+          <a:p>
+            <a:pPr marL="342900" indent="-342900">
+              <a:buFont typeface="Arial" panose="020B0604020202020204" pitchFamily="34" charset="0"/>
+              <a:buChar char="•"/>
+            </a:pPr>
+            <a:endParaRPr lang="de-DE" sz="2000" b="1" dirty="0">
+              <a:sym typeface="Wingdings" pitchFamily="2" charset="2"/>
+            </a:endParaRPr>
+          </a:p>
+          <a:p>
+            <a:pPr marL="342900" indent="-342900">
+              <a:buFont typeface="Wingdings" pitchFamily="2" charset="2"/>
+              <a:buChar char="à"/>
+            </a:pPr>
+            <a:r>
+              <a:rPr lang="de-DE" sz="2000" b="1" dirty="0">
+                <a:sym typeface="Wingdings" pitchFamily="2" charset="2"/>
+              </a:rPr>
+              <a:t>Have a good chance to model S and R. But still impossible to predict whole series, as long as we cannot model trend L.</a:t>
+            </a:r>
+          </a:p>
+          <a:p>
+            <a:pPr marL="342900" indent="-342900">
+              <a:buFont typeface="Wingdings" pitchFamily="2" charset="2"/>
+              <a:buChar char="à"/>
+            </a:pPr>
+            <a:endParaRPr lang="de-DE" sz="2000" b="1" dirty="0">
+              <a:sym typeface="Wingdings" pitchFamily="2" charset="2"/>
+            </a:endParaRPr>
+          </a:p>
+          <a:p>
+            <a:r>
+              <a:rPr lang="de-DE" sz="2000" dirty="0">
+                <a:sym typeface="Wingdings" pitchFamily="2" charset="2"/>
+              </a:rPr>
+              <a:t>Try: Input original SP500 series plus L, S, R into baseESN (next slide!)</a:t>
+            </a:r>
+          </a:p>
+        </p:txBody>
+      </p:sp>
+      <p:pic>
+        <p:nvPicPr>
+          <p:cNvPr id="2" name="Grafik 1">
+            <a:extLst>
+              <a:ext uri="{FF2B5EF4-FFF2-40B4-BE49-F238E27FC236}">
+                <a16:creationId xmlns:a16="http://schemas.microsoft.com/office/drawing/2014/main" id="{7A4611DA-408B-7046-AE3C-6C43E71310F7}"/>
+              </a:ext>
+            </a:extLst>
+          </p:cNvPr>
+          <p:cNvPicPr>
+            <a:picLocks noChangeAspect="1"/>
+          </p:cNvPicPr>
+          <p:nvPr/>
+        </p:nvPicPr>
+        <p:blipFill>
+          <a:blip r:embed="rId3"/>
+          <a:stretch>
+            <a:fillRect/>
+          </a:stretch>
+        </p:blipFill>
+        <p:spPr>
+          <a:xfrm>
+            <a:off x="365768" y="3806544"/>
+            <a:ext cx="9639300" cy="1536700"/>
+          </a:xfrm>
+          <a:prstGeom prst="rect">
+            <a:avLst/>
+          </a:prstGeom>
+          <a:ln>
+            <a:solidFill>
+              <a:schemeClr val="tx1"/>
+            </a:solidFill>
+          </a:ln>
+        </p:spPr>
+      </p:pic>
+    </p:spTree>
+    <p:extLst>
+      <p:ext uri="{BB962C8B-B14F-4D97-AF65-F5344CB8AC3E}">
+        <p14:creationId xmlns:p14="http://schemas.microsoft.com/office/powerpoint/2010/main" val="1392171107"/>
+      </p:ext>
+    </p:extLst>
+  </p:cSld>
+  <p:clrMapOvr>
+    <a:masterClrMapping/>
+  </p:clrMapOvr>
+</p:sld>
+</file>
+
+<file path=ppt/slides/slide15.xml><?xml version="1.0" encoding="utf-8"?>
+<p:sld xmlns:a="http://schemas.openxmlformats.org/drawingml/2006/main" xmlns:r="http://schemas.openxmlformats.org/officeDocument/2006/relationships" xmlns:p="http://schemas.openxmlformats.org/presentationml/2006/main">
+  <p:cSld>
+    <p:spTree>
+      <p:nvGrpSpPr>
+        <p:cNvPr id="1" name=""/>
+        <p:cNvGrpSpPr/>
+        <p:nvPr/>
+      </p:nvGrpSpPr>
+      <p:grpSpPr>
+        <a:xfrm>
+          <a:off x="0" y="0"/>
+          <a:ext cx="0" cy="0"/>
+          <a:chOff x="0" y="0"/>
+          <a:chExt cx="0" cy="0"/>
+        </a:xfrm>
+      </p:grpSpPr>
+      <p:pic>
+        <p:nvPicPr>
+          <p:cNvPr id="3074" name="Picture 2">
+            <a:extLst>
+              <a:ext uri="{FF2B5EF4-FFF2-40B4-BE49-F238E27FC236}">
+                <a16:creationId xmlns:a16="http://schemas.microsoft.com/office/drawing/2014/main" id="{9E0D7CED-E50D-734C-A757-E8F1E8B9483C}"/>
+              </a:ext>
+            </a:extLst>
+          </p:cNvPr>
+          <p:cNvPicPr>
+            <a:picLocks noChangeAspect="1" noChangeArrowheads="1"/>
+          </p:cNvPicPr>
+          <p:nvPr/>
+        </p:nvPicPr>
+        <p:blipFill>
+          <a:blip r:embed="rId3">
+            <a:extLst>
+              <a:ext uri="{28A0092B-C50C-407E-A947-70E740481C1C}">
+                <a14:useLocalDpi xmlns:a14="http://schemas.microsoft.com/office/drawing/2010/main" val="0"/>
+              </a:ext>
+            </a:extLst>
+          </a:blip>
+          <a:srcRect/>
+          <a:stretch>
+            <a:fillRect/>
+          </a:stretch>
+        </p:blipFill>
+        <p:spPr bwMode="auto">
+          <a:xfrm>
+            <a:off x="136765" y="157452"/>
+            <a:ext cx="6987024" cy="3699880"/>
+          </a:xfrm>
+          <a:prstGeom prst="rect">
+            <a:avLst/>
+          </a:prstGeom>
+          <a:noFill/>
+          <a:extLst>
+            <a:ext uri="{909E8E84-426E-40DD-AFC4-6F175D3DCCD1}">
+              <a14:hiddenFill xmlns:a14="http://schemas.microsoft.com/office/drawing/2010/main">
+                <a:solidFill>
+                  <a:srgbClr val="FFFFFF"/>
+                </a:solidFill>
+              </a14:hiddenFill>
+            </a:ext>
+          </a:extLst>
+        </p:spPr>
+      </p:pic>
+      <p:pic>
+        <p:nvPicPr>
+          <p:cNvPr id="5122" name="Picture 2">
+            <a:extLst>
+              <a:ext uri="{FF2B5EF4-FFF2-40B4-BE49-F238E27FC236}">
+                <a16:creationId xmlns:a16="http://schemas.microsoft.com/office/drawing/2014/main" id="{94081D02-DECC-6B4A-A4A0-3DB01FFFC06E}"/>
+              </a:ext>
+            </a:extLst>
+          </p:cNvPr>
+          <p:cNvPicPr>
+            <a:picLocks noChangeAspect="1" noChangeArrowheads="1"/>
+          </p:cNvPicPr>
+          <p:nvPr/>
+        </p:nvPicPr>
+        <p:blipFill>
+          <a:blip r:embed="rId4">
+            <a:extLst>
+              <a:ext uri="{28A0092B-C50C-407E-A947-70E740481C1C}">
+                <a14:useLocalDpi xmlns:a14="http://schemas.microsoft.com/office/drawing/2010/main" val="0"/>
+              </a:ext>
+            </a:extLst>
+          </a:blip>
+          <a:srcRect/>
+          <a:stretch>
+            <a:fillRect/>
+          </a:stretch>
+        </p:blipFill>
+        <p:spPr bwMode="auto">
+          <a:xfrm>
+            <a:off x="4239965" y="2794607"/>
+            <a:ext cx="7469529" cy="3905941"/>
+          </a:xfrm>
+          <a:prstGeom prst="rect">
+            <a:avLst/>
+          </a:prstGeom>
+          <a:noFill/>
+          <a:extLst>
+            <a:ext uri="{909E8E84-426E-40DD-AFC4-6F175D3DCCD1}">
+              <a14:hiddenFill xmlns:a14="http://schemas.microsoft.com/office/drawing/2010/main">
+                <a:solidFill>
+                  <a:srgbClr val="FFFFFF"/>
+                </a:solidFill>
+              </a14:hiddenFill>
+            </a:ext>
+          </a:extLst>
+        </p:spPr>
+      </p:pic>
+      <p:sp>
+        <p:nvSpPr>
+          <p:cNvPr id="2" name="Rechteck 1">
+            <a:extLst>
+              <a:ext uri="{FF2B5EF4-FFF2-40B4-BE49-F238E27FC236}">
+                <a16:creationId xmlns:a16="http://schemas.microsoft.com/office/drawing/2014/main" id="{DE0683E0-1A82-284E-99AD-120065AB88E4}"/>
+              </a:ext>
+            </a:extLst>
+          </p:cNvPr>
+          <p:cNvSpPr/>
+          <p:nvPr/>
+        </p:nvSpPr>
+        <p:spPr>
+          <a:xfrm>
+            <a:off x="706056" y="2639028"/>
+            <a:ext cx="381964" cy="789972"/>
+          </a:xfrm>
+          <a:prstGeom prst="rect">
+            <a:avLst/>
+          </a:prstGeom>
+          <a:solidFill>
+            <a:srgbClr val="C00000">
+              <a:alpha val="20000"/>
+            </a:srgbClr>
+          </a:solidFill>
+          <a:ln w="19050"/>
+        </p:spPr>
+        <p:style>
+          <a:lnRef idx="2">
+            <a:schemeClr val="accent1">
+              <a:shade val="50000"/>
+            </a:schemeClr>
+          </a:lnRef>
+          <a:fillRef idx="1">
+            <a:schemeClr val="accent1"/>
+          </a:fillRef>
+          <a:effectRef idx="0">
+            <a:schemeClr val="accent1"/>
+          </a:effectRef>
+          <a:fontRef idx="minor">
+            <a:schemeClr val="lt1"/>
+          </a:fontRef>
+        </p:style>
+        <p:txBody>
+          <a:bodyPr rtlCol="0" anchor="ctr"/>
+          <a:lstStyle/>
+          <a:p>
+            <a:pPr algn="ctr"/>
+            <a:endParaRPr lang="de-DE"/>
+          </a:p>
+        </p:txBody>
+      </p:sp>
+      <p:cxnSp>
+        <p:nvCxnSpPr>
+          <p:cNvPr id="4" name="Gerade Verbindung 3">
+            <a:extLst>
+              <a:ext uri="{FF2B5EF4-FFF2-40B4-BE49-F238E27FC236}">
+                <a16:creationId xmlns:a16="http://schemas.microsoft.com/office/drawing/2014/main" id="{180832FF-C040-4448-BC74-CDFFBE932FAB}"/>
+              </a:ext>
+            </a:extLst>
+          </p:cNvPr>
+          <p:cNvCxnSpPr/>
+          <p:nvPr/>
+        </p:nvCxnSpPr>
+        <p:spPr>
+          <a:xfrm>
+            <a:off x="706056" y="3429000"/>
+            <a:ext cx="4027990" cy="2948651"/>
+          </a:xfrm>
+          <a:prstGeom prst="line">
+            <a:avLst/>
+          </a:prstGeom>
+        </p:spPr>
+        <p:style>
+          <a:lnRef idx="1">
+            <a:schemeClr val="accent2"/>
+          </a:lnRef>
+          <a:fillRef idx="0">
+            <a:schemeClr val="accent2"/>
+          </a:fillRef>
+          <a:effectRef idx="0">
+            <a:schemeClr val="accent2"/>
+          </a:effectRef>
+          <a:fontRef idx="minor">
+            <a:schemeClr val="tx1"/>
+          </a:fontRef>
+        </p:style>
+      </p:cxnSp>
+      <p:cxnSp>
+        <p:nvCxnSpPr>
+          <p:cNvPr id="6" name="Gerade Verbindung 5">
+            <a:extLst>
+              <a:ext uri="{FF2B5EF4-FFF2-40B4-BE49-F238E27FC236}">
+                <a16:creationId xmlns:a16="http://schemas.microsoft.com/office/drawing/2014/main" id="{60A6FE8A-6C5A-474E-BE92-6B761062F20D}"/>
+              </a:ext>
+            </a:extLst>
+          </p:cNvPr>
+          <p:cNvCxnSpPr/>
+          <p:nvPr/>
+        </p:nvCxnSpPr>
+        <p:spPr>
+          <a:xfrm>
+            <a:off x="1088020" y="2639028"/>
+            <a:ext cx="3646026" cy="394986"/>
+          </a:xfrm>
+          <a:prstGeom prst="line">
+            <a:avLst/>
+          </a:prstGeom>
+        </p:spPr>
+        <p:style>
+          <a:lnRef idx="1">
+            <a:schemeClr val="accent2"/>
+          </a:lnRef>
+          <a:fillRef idx="0">
+            <a:schemeClr val="accent2"/>
+          </a:fillRef>
+          <a:effectRef idx="0">
+            <a:schemeClr val="accent2"/>
+          </a:effectRef>
+          <a:fontRef idx="minor">
+            <a:schemeClr val="tx1"/>
+          </a:fontRef>
+        </p:style>
+      </p:cxnSp>
+      <p:sp>
+        <p:nvSpPr>
+          <p:cNvPr id="7" name="Textfeld 6">
+            <a:extLst>
+              <a:ext uri="{FF2B5EF4-FFF2-40B4-BE49-F238E27FC236}">
+                <a16:creationId xmlns:a16="http://schemas.microsoft.com/office/drawing/2014/main" id="{3AD2FA20-8660-0949-8DBD-75982E4B622B}"/>
+              </a:ext>
+            </a:extLst>
+          </p:cNvPr>
+          <p:cNvSpPr txBox="1"/>
+          <p:nvPr/>
+        </p:nvSpPr>
+        <p:spPr>
+          <a:xfrm>
+            <a:off x="8617555" y="1152864"/>
+            <a:ext cx="2552016" cy="646331"/>
+          </a:xfrm>
+          <a:prstGeom prst="rect">
+            <a:avLst/>
+          </a:prstGeom>
+          <a:noFill/>
+        </p:spPr>
+        <p:txBody>
+          <a:bodyPr wrap="square" rtlCol="0">
+            <a:spAutoFit/>
+          </a:bodyPr>
+          <a:lstStyle/>
+          <a:p>
+            <a:r>
+              <a:rPr lang="de-DE"/>
+              <a:t>input_length = 10</a:t>
+            </a:r>
+          </a:p>
+          <a:p>
+            <a:r>
+              <a:rPr lang="de-DE">
+                <a:solidFill>
+                  <a:srgbClr val="FF0000"/>
+                </a:solidFill>
+              </a:rPr>
+              <a:t>target_length = 1</a:t>
+            </a:r>
+          </a:p>
+        </p:txBody>
+      </p:sp>
+      <p:sp>
+        <p:nvSpPr>
+          <p:cNvPr id="11" name="Textfeld 10">
+            <a:extLst>
+              <a:ext uri="{FF2B5EF4-FFF2-40B4-BE49-F238E27FC236}">
+                <a16:creationId xmlns:a16="http://schemas.microsoft.com/office/drawing/2014/main" id="{89D6EA67-CA01-0B4D-A7D7-A76A4E94ECC6}"/>
+              </a:ext>
+            </a:extLst>
+          </p:cNvPr>
+          <p:cNvSpPr txBox="1"/>
+          <p:nvPr/>
+        </p:nvSpPr>
+        <p:spPr>
+          <a:xfrm>
+            <a:off x="5586917" y="4747577"/>
+            <a:ext cx="2552016" cy="923330"/>
+          </a:xfrm>
+          <a:prstGeom prst="rect">
+            <a:avLst/>
+          </a:prstGeom>
+          <a:noFill/>
+        </p:spPr>
+        <p:txBody>
+          <a:bodyPr wrap="square" rtlCol="0">
+            <a:spAutoFit/>
+          </a:bodyPr>
+          <a:lstStyle/>
+          <a:p>
+            <a:r>
+              <a:rPr lang="de-DE"/>
+              <a:t>find </a:t>
+            </a:r>
+            <a:r>
+              <a:rPr lang="de-DE">
+                <a:solidFill>
+                  <a:srgbClr val="FF0000"/>
+                </a:solidFill>
+              </a:rPr>
+              <a:t>lag</a:t>
+            </a:r>
+            <a:r>
+              <a:rPr lang="de-DE"/>
+              <a:t> (= target_length) between prediction and true values</a:t>
+            </a:r>
+          </a:p>
+        </p:txBody>
+      </p:sp>
+    </p:spTree>
+    <p:extLst>
+      <p:ext uri="{BB962C8B-B14F-4D97-AF65-F5344CB8AC3E}">
+        <p14:creationId xmlns:p14="http://schemas.microsoft.com/office/powerpoint/2010/main" val="2928714891"/>
+      </p:ext>
+    </p:extLst>
+  </p:cSld>
+  <p:clrMapOvr>
+    <a:masterClrMapping/>
+  </p:clrMapOvr>
+</p:sld>
+</file>
+
+<file path=ppt/slides/slide16.xml><?xml version="1.0" encoding="utf-8"?>
+<p:sld xmlns:a="http://schemas.openxmlformats.org/drawingml/2006/main" xmlns:r="http://schemas.openxmlformats.org/officeDocument/2006/relationships" xmlns:p="http://schemas.openxmlformats.org/presentationml/2006/main">
+  <p:cSld>
+    <p:spTree>
+      <p:nvGrpSpPr>
+        <p:cNvPr id="1" name=""/>
+        <p:cNvGrpSpPr/>
+        <p:nvPr/>
+      </p:nvGrpSpPr>
+      <p:grpSpPr>
+        <a:xfrm>
+          <a:off x="0" y="0"/>
+          <a:ext cx="0" cy="0"/>
+          <a:chOff x="0" y="0"/>
+          <a:chExt cx="0" cy="0"/>
+        </a:xfrm>
+      </p:grpSpPr>
+      <p:pic>
+        <p:nvPicPr>
+          <p:cNvPr id="7170" name="Picture 2">
+            <a:extLst>
+              <a:ext uri="{FF2B5EF4-FFF2-40B4-BE49-F238E27FC236}">
+                <a16:creationId xmlns:a16="http://schemas.microsoft.com/office/drawing/2014/main" id="{97A96053-3002-9447-8394-44F7E8EBE8B0}"/>
+              </a:ext>
+            </a:extLst>
+          </p:cNvPr>
+          <p:cNvPicPr>
+            <a:picLocks noChangeAspect="1" noChangeArrowheads="1"/>
+          </p:cNvPicPr>
+          <p:nvPr/>
+        </p:nvPicPr>
+        <p:blipFill>
+          <a:blip r:embed="rId3">
+            <a:extLst>
+              <a:ext uri="{28A0092B-C50C-407E-A947-70E740481C1C}">
+                <a14:useLocalDpi xmlns:a14="http://schemas.microsoft.com/office/drawing/2010/main" val="0"/>
+              </a:ext>
+            </a:extLst>
+          </a:blip>
+          <a:srcRect/>
+          <a:stretch>
+            <a:fillRect/>
+          </a:stretch>
+        </p:blipFill>
+        <p:spPr bwMode="auto">
+          <a:xfrm>
+            <a:off x="-1" y="60876"/>
+            <a:ext cx="6595495" cy="3492551"/>
+          </a:xfrm>
+          <a:prstGeom prst="rect">
+            <a:avLst/>
+          </a:prstGeom>
+          <a:noFill/>
+          <a:extLst>
+            <a:ext uri="{909E8E84-426E-40DD-AFC4-6F175D3DCCD1}">
+              <a14:hiddenFill xmlns:a14="http://schemas.microsoft.com/office/drawing/2010/main">
+                <a:solidFill>
+                  <a:srgbClr val="FFFFFF"/>
+                </a:solidFill>
+              </a14:hiddenFill>
+            </a:ext>
+          </a:extLst>
+        </p:spPr>
+      </p:pic>
+      <p:pic>
+        <p:nvPicPr>
+          <p:cNvPr id="7172" name="Picture 4">
+            <a:extLst>
+              <a:ext uri="{FF2B5EF4-FFF2-40B4-BE49-F238E27FC236}">
+                <a16:creationId xmlns:a16="http://schemas.microsoft.com/office/drawing/2014/main" id="{3C74A76D-6CC1-204A-8471-41B76646D40D}"/>
+              </a:ext>
+            </a:extLst>
+          </p:cNvPr>
+          <p:cNvPicPr>
+            <a:picLocks noChangeAspect="1" noChangeArrowheads="1"/>
+          </p:cNvPicPr>
+          <p:nvPr/>
+        </p:nvPicPr>
+        <p:blipFill>
+          <a:blip r:embed="rId4">
+            <a:extLst>
+              <a:ext uri="{28A0092B-C50C-407E-A947-70E740481C1C}">
+                <a14:useLocalDpi xmlns:a14="http://schemas.microsoft.com/office/drawing/2010/main" val="0"/>
+              </a:ext>
+            </a:extLst>
+          </a:blip>
+          <a:srcRect/>
+          <a:stretch>
+            <a:fillRect/>
+          </a:stretch>
+        </p:blipFill>
+        <p:spPr bwMode="auto">
+          <a:xfrm>
+            <a:off x="4784510" y="2743200"/>
+            <a:ext cx="7407490" cy="3873500"/>
+          </a:xfrm>
+          <a:prstGeom prst="rect">
+            <a:avLst/>
+          </a:prstGeom>
+          <a:noFill/>
+          <a:extLst>
+            <a:ext uri="{909E8E84-426E-40DD-AFC4-6F175D3DCCD1}">
+              <a14:hiddenFill xmlns:a14="http://schemas.microsoft.com/office/drawing/2010/main">
+                <a:solidFill>
+                  <a:srgbClr val="FFFFFF"/>
+                </a:solidFill>
+              </a14:hiddenFill>
+            </a:ext>
+          </a:extLst>
+        </p:spPr>
+      </p:pic>
+      <p:sp>
+        <p:nvSpPr>
+          <p:cNvPr id="2" name="Rechteck 1">
+            <a:extLst>
+              <a:ext uri="{FF2B5EF4-FFF2-40B4-BE49-F238E27FC236}">
+                <a16:creationId xmlns:a16="http://schemas.microsoft.com/office/drawing/2014/main" id="{DE0683E0-1A82-284E-99AD-120065AB88E4}"/>
+              </a:ext>
+            </a:extLst>
+          </p:cNvPr>
+          <p:cNvSpPr/>
+          <p:nvPr/>
+        </p:nvSpPr>
+        <p:spPr>
+          <a:xfrm>
+            <a:off x="555581" y="2419103"/>
+            <a:ext cx="381964" cy="789972"/>
+          </a:xfrm>
+          <a:prstGeom prst="rect">
+            <a:avLst/>
+          </a:prstGeom>
+          <a:solidFill>
+            <a:srgbClr val="C00000">
+              <a:alpha val="20000"/>
+            </a:srgbClr>
+          </a:solidFill>
+          <a:ln w="19050"/>
+        </p:spPr>
+        <p:style>
+          <a:lnRef idx="2">
+            <a:schemeClr val="accent1">
+              <a:shade val="50000"/>
+            </a:schemeClr>
+          </a:lnRef>
+          <a:fillRef idx="1">
+            <a:schemeClr val="accent1"/>
+          </a:fillRef>
+          <a:effectRef idx="0">
+            <a:schemeClr val="accent1"/>
+          </a:effectRef>
+          <a:fontRef idx="minor">
+            <a:schemeClr val="lt1"/>
+          </a:fontRef>
+        </p:style>
+        <p:txBody>
+          <a:bodyPr rtlCol="0" anchor="ctr"/>
+          <a:lstStyle/>
+          <a:p>
+            <a:pPr algn="ctr"/>
+            <a:endParaRPr lang="de-DE"/>
+          </a:p>
+        </p:txBody>
+      </p:sp>
+      <p:cxnSp>
+        <p:nvCxnSpPr>
+          <p:cNvPr id="4" name="Gerade Verbindung 3">
+            <a:extLst>
+              <a:ext uri="{FF2B5EF4-FFF2-40B4-BE49-F238E27FC236}">
+                <a16:creationId xmlns:a16="http://schemas.microsoft.com/office/drawing/2014/main" id="{180832FF-C040-4448-BC74-CDFFBE932FAB}"/>
+              </a:ext>
+            </a:extLst>
+          </p:cNvPr>
+          <p:cNvCxnSpPr>
+            <a:cxnSpLocks/>
+          </p:cNvCxnSpPr>
+          <p:nvPr/>
+        </p:nvCxnSpPr>
+        <p:spPr>
+          <a:xfrm>
+            <a:off x="950083" y="3209075"/>
+            <a:ext cx="4270099" cy="3026676"/>
+          </a:xfrm>
+          <a:prstGeom prst="line">
+            <a:avLst/>
+          </a:prstGeom>
+        </p:spPr>
+        <p:style>
+          <a:lnRef idx="1">
+            <a:schemeClr val="accent2"/>
+          </a:lnRef>
+          <a:fillRef idx="0">
+            <a:schemeClr val="accent2"/>
+          </a:fillRef>
+          <a:effectRef idx="0">
+            <a:schemeClr val="accent2"/>
+          </a:effectRef>
+          <a:fontRef idx="minor">
+            <a:schemeClr val="tx1"/>
+          </a:fontRef>
+        </p:style>
+      </p:cxnSp>
+      <p:cxnSp>
+        <p:nvCxnSpPr>
+          <p:cNvPr id="6" name="Gerade Verbindung 5">
+            <a:extLst>
+              <a:ext uri="{FF2B5EF4-FFF2-40B4-BE49-F238E27FC236}">
+                <a16:creationId xmlns:a16="http://schemas.microsoft.com/office/drawing/2014/main" id="{60A6FE8A-6C5A-474E-BE92-6B761062F20D}"/>
+              </a:ext>
+            </a:extLst>
+          </p:cNvPr>
+          <p:cNvCxnSpPr>
+            <a:cxnSpLocks/>
+          </p:cNvCxnSpPr>
+          <p:nvPr/>
+        </p:nvCxnSpPr>
+        <p:spPr>
+          <a:xfrm>
+            <a:off x="988009" y="2419109"/>
+            <a:ext cx="4232173" cy="509286"/>
+          </a:xfrm>
+          <a:prstGeom prst="line">
+            <a:avLst/>
+          </a:prstGeom>
+        </p:spPr>
+        <p:style>
+          <a:lnRef idx="1">
+            <a:schemeClr val="accent2"/>
+          </a:lnRef>
+          <a:fillRef idx="0">
+            <a:schemeClr val="accent2"/>
+          </a:fillRef>
+          <a:effectRef idx="0">
+            <a:schemeClr val="accent2"/>
+          </a:effectRef>
+          <a:fontRef idx="minor">
+            <a:schemeClr val="tx1"/>
+          </a:fontRef>
+        </p:style>
+      </p:cxnSp>
+      <p:sp>
+        <p:nvSpPr>
+          <p:cNvPr id="7" name="Textfeld 6">
+            <a:extLst>
+              <a:ext uri="{FF2B5EF4-FFF2-40B4-BE49-F238E27FC236}">
+                <a16:creationId xmlns:a16="http://schemas.microsoft.com/office/drawing/2014/main" id="{3AD2FA20-8660-0949-8DBD-75982E4B622B}"/>
+              </a:ext>
+            </a:extLst>
+          </p:cNvPr>
+          <p:cNvSpPr txBox="1"/>
+          <p:nvPr/>
+        </p:nvSpPr>
+        <p:spPr>
+          <a:xfrm>
+            <a:off x="8617555" y="1152864"/>
+            <a:ext cx="2552016" cy="646331"/>
+          </a:xfrm>
+          <a:prstGeom prst="rect">
+            <a:avLst/>
+          </a:prstGeom>
+          <a:noFill/>
+        </p:spPr>
+        <p:txBody>
+          <a:bodyPr wrap="square" rtlCol="0">
+            <a:spAutoFit/>
+          </a:bodyPr>
+          <a:lstStyle/>
+          <a:p>
+            <a:r>
+              <a:rPr lang="de-DE"/>
+              <a:t>input_length = 10</a:t>
+            </a:r>
+          </a:p>
+          <a:p>
+            <a:r>
+              <a:rPr lang="de-DE">
+                <a:solidFill>
+                  <a:srgbClr val="FF0000"/>
+                </a:solidFill>
+              </a:rPr>
+              <a:t>target_length = 3</a:t>
+            </a:r>
+          </a:p>
+        </p:txBody>
+      </p:sp>
+      <p:sp>
+        <p:nvSpPr>
+          <p:cNvPr id="11" name="Textfeld 10">
+            <a:extLst>
+              <a:ext uri="{FF2B5EF4-FFF2-40B4-BE49-F238E27FC236}">
+                <a16:creationId xmlns:a16="http://schemas.microsoft.com/office/drawing/2014/main" id="{89D6EA67-CA01-0B4D-A7D7-A76A4E94ECC6}"/>
+              </a:ext>
+            </a:extLst>
+          </p:cNvPr>
+          <p:cNvSpPr txBox="1"/>
+          <p:nvPr/>
+        </p:nvSpPr>
+        <p:spPr>
+          <a:xfrm>
+            <a:off x="5586917" y="4747577"/>
+            <a:ext cx="2552016" cy="923330"/>
+          </a:xfrm>
+          <a:prstGeom prst="rect">
+            <a:avLst/>
+          </a:prstGeom>
+          <a:noFill/>
+        </p:spPr>
+        <p:txBody>
+          <a:bodyPr wrap="square" rtlCol="0">
+            <a:spAutoFit/>
+          </a:bodyPr>
+          <a:lstStyle/>
+          <a:p>
+            <a:r>
+              <a:rPr lang="de-DE"/>
+              <a:t>find </a:t>
+            </a:r>
+            <a:r>
+              <a:rPr lang="de-DE">
+                <a:solidFill>
+                  <a:srgbClr val="FF0000"/>
+                </a:solidFill>
+              </a:rPr>
+              <a:t>lag</a:t>
+            </a:r>
+            <a:r>
+              <a:rPr lang="de-DE"/>
+              <a:t> (= target_length) between prediction and true values</a:t>
+            </a:r>
+          </a:p>
+        </p:txBody>
+      </p:sp>
+      <p:sp>
+        <p:nvSpPr>
+          <p:cNvPr id="14" name="Textfeld 13">
+            <a:extLst>
+              <a:ext uri="{FF2B5EF4-FFF2-40B4-BE49-F238E27FC236}">
+                <a16:creationId xmlns:a16="http://schemas.microsoft.com/office/drawing/2014/main" id="{FCECCCE1-E177-2847-8C24-0F39931A5523}"/>
+              </a:ext>
+            </a:extLst>
+          </p:cNvPr>
+          <p:cNvSpPr txBox="1"/>
+          <p:nvPr/>
+        </p:nvSpPr>
+        <p:spPr>
+          <a:xfrm>
+            <a:off x="646457" y="383339"/>
+            <a:ext cx="2443984" cy="923330"/>
+          </a:xfrm>
+          <a:prstGeom prst="rect">
+            <a:avLst/>
+          </a:prstGeom>
+          <a:noFill/>
+        </p:spPr>
+        <p:txBody>
+          <a:bodyPr wrap="square" rtlCol="0">
+            <a:spAutoFit/>
+          </a:bodyPr>
+          <a:lstStyle/>
+          <a:p>
+            <a:r>
+              <a:rPr lang="de-DE">
+                <a:solidFill>
+                  <a:srgbClr val="FF0000"/>
+                </a:solidFill>
+              </a:rPr>
+              <a:t>unstable</a:t>
+            </a:r>
+            <a:r>
+              <a:rPr lang="de-DE"/>
+              <a:t> prediction, when it get‘s rough, plus </a:t>
+            </a:r>
+            <a:r>
+              <a:rPr lang="de-DE">
+                <a:solidFill>
+                  <a:srgbClr val="FF0000"/>
+                </a:solidFill>
+              </a:rPr>
+              <a:t>inversion</a:t>
+            </a:r>
+            <a:r>
+              <a:rPr lang="de-DE"/>
+              <a:t>!</a:t>
+            </a:r>
+          </a:p>
+        </p:txBody>
+      </p:sp>
+    </p:spTree>
+    <p:extLst>
+      <p:ext uri="{BB962C8B-B14F-4D97-AF65-F5344CB8AC3E}">
+        <p14:creationId xmlns:p14="http://schemas.microsoft.com/office/powerpoint/2010/main" val="1212764872"/>
+      </p:ext>
+    </p:extLst>
+  </p:cSld>
+  <p:clrMapOvr>
+    <a:masterClrMapping/>
+  </p:clrMapOvr>
+</p:sld>
+</file>
+
+<file path=ppt/slides/slide17.xml><?xml version="1.0" encoding="utf-8"?>
+<p:sld xmlns:a="http://schemas.openxmlformats.org/drawingml/2006/main" xmlns:r="http://schemas.openxmlformats.org/officeDocument/2006/relationships" xmlns:p="http://schemas.openxmlformats.org/presentationml/2006/main">
+  <p:cSld>
+    <p:spTree>
+      <p:nvGrpSpPr>
+        <p:cNvPr id="1" name=""/>
+        <p:cNvGrpSpPr/>
+        <p:nvPr/>
+      </p:nvGrpSpPr>
+      <p:grpSpPr>
+        <a:xfrm>
+          <a:off x="0" y="0"/>
+          <a:ext cx="0" cy="0"/>
+          <a:chOff x="0" y="0"/>
+          <a:chExt cx="0" cy="0"/>
+        </a:xfrm>
+      </p:grpSpPr>
+      <p:sp>
+        <p:nvSpPr>
+          <p:cNvPr id="52" name="Textfeld 51">
+            <a:extLst>
+              <a:ext uri="{FF2B5EF4-FFF2-40B4-BE49-F238E27FC236}">
+                <a16:creationId xmlns:a16="http://schemas.microsoft.com/office/drawing/2014/main" id="{02D46DD5-A467-5A4F-9B9C-C0FBA091B004}"/>
+              </a:ext>
+            </a:extLst>
+          </p:cNvPr>
+          <p:cNvSpPr txBox="1"/>
+          <p:nvPr/>
+        </p:nvSpPr>
+        <p:spPr>
+          <a:xfrm>
+            <a:off x="365769" y="302411"/>
+            <a:ext cx="6674128" cy="461665"/>
+          </a:xfrm>
+          <a:prstGeom prst="rect">
+            <a:avLst/>
+          </a:prstGeom>
+          <a:noFill/>
+        </p:spPr>
+        <p:txBody>
+          <a:bodyPr wrap="square" rtlCol="0">
+            <a:spAutoFit/>
+          </a:bodyPr>
+          <a:lstStyle/>
+          <a:p>
+            <a:r>
+              <a:rPr lang="de-DE" sz="2400" dirty="0" err="1"/>
+              <a:t>Another example: </a:t>
+            </a:r>
+            <a:r>
+              <a:rPr lang="de-DE" sz="2400" b="1" dirty="0" err="1"/>
+              <a:t>Airline passengers</a:t>
+            </a:r>
+          </a:p>
+        </p:txBody>
+      </p:sp>
+      <p:pic>
+        <p:nvPicPr>
+          <p:cNvPr id="9218" name="Picture 2">
+            <a:extLst>
+              <a:ext uri="{FF2B5EF4-FFF2-40B4-BE49-F238E27FC236}">
+                <a16:creationId xmlns:a16="http://schemas.microsoft.com/office/drawing/2014/main" id="{0F740D50-A44C-0340-B7C6-EEB22F9E89E2}"/>
+              </a:ext>
+            </a:extLst>
+          </p:cNvPr>
+          <p:cNvPicPr>
+            <a:picLocks noChangeAspect="1" noChangeArrowheads="1"/>
+          </p:cNvPicPr>
+          <p:nvPr/>
+        </p:nvPicPr>
+        <p:blipFill>
+          <a:blip r:embed="rId3">
+            <a:extLst>
+              <a:ext uri="{28A0092B-C50C-407E-A947-70E740481C1C}">
+                <a14:useLocalDpi xmlns:a14="http://schemas.microsoft.com/office/drawing/2010/main" val="0"/>
+              </a:ext>
+            </a:extLst>
+          </a:blip>
+          <a:srcRect/>
+          <a:stretch>
+            <a:fillRect/>
+          </a:stretch>
+        </p:blipFill>
+        <p:spPr bwMode="auto">
+          <a:xfrm>
+            <a:off x="365769" y="1122672"/>
+            <a:ext cx="11353800" cy="3581400"/>
+          </a:xfrm>
+          <a:prstGeom prst="rect">
+            <a:avLst/>
+          </a:prstGeom>
+          <a:noFill/>
+          <a:extLst>
+            <a:ext uri="{909E8E84-426E-40DD-AFC4-6F175D3DCCD1}">
+              <a14:hiddenFill xmlns:a14="http://schemas.microsoft.com/office/drawing/2010/main">
+                <a:solidFill>
+                  <a:srgbClr val="FFFFFF"/>
+                </a:solidFill>
+              </a14:hiddenFill>
+            </a:ext>
+          </a:extLst>
+        </p:spPr>
+      </p:pic>
+    </p:spTree>
+    <p:extLst>
+      <p:ext uri="{BB962C8B-B14F-4D97-AF65-F5344CB8AC3E}">
+        <p14:creationId xmlns:p14="http://schemas.microsoft.com/office/powerpoint/2010/main" val="843941814"/>
+      </p:ext>
+    </p:extLst>
+  </p:cSld>
+  <p:clrMapOvr>
+    <a:masterClrMapping/>
+  </p:clrMapOvr>
+</p:sld>
+</file>
+
+<file path=ppt/slides/slide18.xml><?xml version="1.0" encoding="utf-8"?>
+<p:sld xmlns:a="http://schemas.openxmlformats.org/drawingml/2006/main" xmlns:r="http://schemas.openxmlformats.org/officeDocument/2006/relationships" xmlns:p="http://schemas.openxmlformats.org/presentationml/2006/main">
+  <p:cSld>
+    <p:spTree>
+      <p:nvGrpSpPr>
+        <p:cNvPr id="1" name=""/>
+        <p:cNvGrpSpPr/>
+        <p:nvPr/>
+      </p:nvGrpSpPr>
+      <p:grpSpPr>
+        <a:xfrm>
+          <a:off x="0" y="0"/>
+          <a:ext cx="0" cy="0"/>
+          <a:chOff x="0" y="0"/>
+          <a:chExt cx="0" cy="0"/>
+        </a:xfrm>
+      </p:grpSpPr>
+      <p:sp>
+        <p:nvSpPr>
+          <p:cNvPr id="8" name="Textfeld 7">
+            <a:extLst>
+              <a:ext uri="{FF2B5EF4-FFF2-40B4-BE49-F238E27FC236}">
+                <a16:creationId xmlns:a16="http://schemas.microsoft.com/office/drawing/2014/main" id="{EAA23B28-D537-3D43-B5FA-16F5534CD6F2}"/>
+              </a:ext>
+            </a:extLst>
+          </p:cNvPr>
+          <p:cNvSpPr txBox="1"/>
+          <p:nvPr/>
+        </p:nvSpPr>
+        <p:spPr>
+          <a:xfrm>
+            <a:off x="365769" y="5062669"/>
+            <a:ext cx="4403001" cy="1323439"/>
+          </a:xfrm>
+          <a:prstGeom prst="rect">
+            <a:avLst/>
+          </a:prstGeom>
+          <a:noFill/>
+        </p:spPr>
+        <p:txBody>
+          <a:bodyPr wrap="square" rtlCol="0">
+            <a:spAutoFit/>
+          </a:bodyPr>
+          <a:lstStyle/>
+          <a:p>
+            <a:r>
+              <a:rPr lang="de-DE" sz="2000" dirty="0"/>
+              <a:t>Got smoothing parameters (alpha, gamma) and cycle length (s) empirically:</a:t>
+            </a:r>
+          </a:p>
+          <a:p>
+            <a:r>
+              <a:rPr lang="de-DE" sz="2000" dirty="0"/>
+              <a:t>alpha = 0.05, gamma = 0.8, </a:t>
+            </a:r>
+          </a:p>
+          <a:p>
+            <a:r>
+              <a:rPr lang="de-DE" sz="2000" dirty="0">
+                <a:solidFill>
+                  <a:srgbClr val="FF0000"/>
+                </a:solidFill>
+              </a:rPr>
+              <a:t>s = 12 (known in this case!)</a:t>
+            </a:r>
+          </a:p>
+        </p:txBody>
+      </p:sp>
+      <p:sp>
+        <p:nvSpPr>
+          <p:cNvPr id="7" name="Textfeld 6">
+            <a:extLst>
+              <a:ext uri="{FF2B5EF4-FFF2-40B4-BE49-F238E27FC236}">
+                <a16:creationId xmlns:a16="http://schemas.microsoft.com/office/drawing/2014/main" id="{F2C17D22-BD0D-FE48-8C4B-842529E00DD2}"/>
+              </a:ext>
+            </a:extLst>
+          </p:cNvPr>
+          <p:cNvSpPr txBox="1"/>
+          <p:nvPr/>
+        </p:nvSpPr>
+        <p:spPr>
+          <a:xfrm>
+            <a:off x="365769" y="302411"/>
+            <a:ext cx="4628706" cy="830997"/>
+          </a:xfrm>
+          <a:prstGeom prst="rect">
+            <a:avLst/>
+          </a:prstGeom>
+          <a:noFill/>
+        </p:spPr>
+        <p:txBody>
+          <a:bodyPr wrap="square" rtlCol="0">
+            <a:spAutoFit/>
+          </a:bodyPr>
+          <a:lstStyle/>
+          <a:p>
+            <a:r>
+              <a:rPr lang="de-DE" sz="2400" dirty="0" err="1"/>
+              <a:t>Additive decomposition fails! </a:t>
+            </a:r>
+          </a:p>
+          <a:p>
+            <a:r>
+              <a:rPr lang="de-DE" sz="2400" b="1" dirty="0" err="1"/>
+              <a:t>orig, L and S with p-value = 1</a:t>
+            </a:r>
+          </a:p>
+        </p:txBody>
+      </p:sp>
+      <p:pic>
+        <p:nvPicPr>
+          <p:cNvPr id="11266" name="Picture 2">
+            <a:extLst>
+              <a:ext uri="{FF2B5EF4-FFF2-40B4-BE49-F238E27FC236}">
+                <a16:creationId xmlns:a16="http://schemas.microsoft.com/office/drawing/2014/main" id="{4A173A10-C7CF-774E-BCFA-6FF9F64C5040}"/>
+              </a:ext>
+            </a:extLst>
+          </p:cNvPr>
+          <p:cNvPicPr>
+            <a:picLocks noChangeAspect="1" noChangeArrowheads="1"/>
+          </p:cNvPicPr>
+          <p:nvPr/>
+        </p:nvPicPr>
+        <p:blipFill>
+          <a:blip r:embed="rId3">
+            <a:extLst>
+              <a:ext uri="{28A0092B-C50C-407E-A947-70E740481C1C}">
+                <a14:useLocalDpi xmlns:a14="http://schemas.microsoft.com/office/drawing/2010/main" val="0"/>
+              </a:ext>
+            </a:extLst>
+          </a:blip>
+          <a:srcRect/>
+          <a:stretch>
+            <a:fillRect/>
+          </a:stretch>
+        </p:blipFill>
+        <p:spPr bwMode="auto">
+          <a:xfrm>
+            <a:off x="5122863" y="0"/>
+            <a:ext cx="7069137" cy="6858000"/>
+          </a:xfrm>
+          <a:prstGeom prst="rect">
+            <a:avLst/>
+          </a:prstGeom>
+          <a:noFill/>
+          <a:extLst>
+            <a:ext uri="{909E8E84-426E-40DD-AFC4-6F175D3DCCD1}">
+              <a14:hiddenFill xmlns:a14="http://schemas.microsoft.com/office/drawing/2010/main">
+                <a:solidFill>
+                  <a:srgbClr val="FFFFFF"/>
+                </a:solidFill>
+              </a14:hiddenFill>
+            </a:ext>
+          </a:extLst>
+        </p:spPr>
+      </p:pic>
+      <p:pic>
+        <p:nvPicPr>
+          <p:cNvPr id="2" name="Grafik 1">
+            <a:extLst>
+              <a:ext uri="{FF2B5EF4-FFF2-40B4-BE49-F238E27FC236}">
+                <a16:creationId xmlns:a16="http://schemas.microsoft.com/office/drawing/2014/main" id="{964C9C14-1D52-3E41-BF52-5717D8033834}"/>
+              </a:ext>
+            </a:extLst>
+          </p:cNvPr>
+          <p:cNvPicPr>
+            <a:picLocks noChangeAspect="1"/>
+          </p:cNvPicPr>
+          <p:nvPr/>
+        </p:nvPicPr>
+        <p:blipFill>
+          <a:blip r:embed="rId4"/>
+          <a:stretch>
+            <a:fillRect/>
+          </a:stretch>
+        </p:blipFill>
+        <p:spPr>
+          <a:xfrm>
+            <a:off x="1154867" y="1358138"/>
+            <a:ext cx="2527300" cy="3479800"/>
+          </a:xfrm>
+          <a:prstGeom prst="rect">
+            <a:avLst/>
+          </a:prstGeom>
+        </p:spPr>
+      </p:pic>
+    </p:spTree>
+    <p:extLst>
+      <p:ext uri="{BB962C8B-B14F-4D97-AF65-F5344CB8AC3E}">
+        <p14:creationId xmlns:p14="http://schemas.microsoft.com/office/powerpoint/2010/main" val="1943674831"/>
+      </p:ext>
+    </p:extLst>
+  </p:cSld>
+  <p:clrMapOvr>
+    <a:masterClrMapping/>
+  </p:clrMapOvr>
+</p:sld>
+</file>
+
+<file path=ppt/slides/slide19.xml><?xml version="1.0" encoding="utf-8"?>
+<p:sld xmlns:a="http://schemas.openxmlformats.org/drawingml/2006/main" xmlns:r="http://schemas.openxmlformats.org/officeDocument/2006/relationships" xmlns:p="http://schemas.openxmlformats.org/presentationml/2006/main">
+  <p:cSld>
+    <p:spTree>
+      <p:nvGrpSpPr>
+        <p:cNvPr id="1" name=""/>
+        <p:cNvGrpSpPr/>
+        <p:nvPr/>
+      </p:nvGrpSpPr>
+      <p:grpSpPr>
+        <a:xfrm>
+          <a:off x="0" y="0"/>
+          <a:ext cx="0" cy="0"/>
+          <a:chOff x="0" y="0"/>
+          <a:chExt cx="0" cy="0"/>
+        </a:xfrm>
+      </p:grpSpPr>
+      <p:sp>
+        <p:nvSpPr>
+          <p:cNvPr id="52" name="Textfeld 51">
+            <a:extLst>
+              <a:ext uri="{FF2B5EF4-FFF2-40B4-BE49-F238E27FC236}">
+                <a16:creationId xmlns:a16="http://schemas.microsoft.com/office/drawing/2014/main" id="{02D46DD5-A467-5A4F-9B9C-C0FBA091B004}"/>
+              </a:ext>
+            </a:extLst>
+          </p:cNvPr>
+          <p:cNvSpPr txBox="1"/>
+          <p:nvPr/>
+        </p:nvSpPr>
+        <p:spPr>
+          <a:xfrm>
+            <a:off x="365769" y="302411"/>
+            <a:ext cx="6674128" cy="461665"/>
+          </a:xfrm>
+          <a:prstGeom prst="rect">
+            <a:avLst/>
+          </a:prstGeom>
+          <a:noFill/>
+        </p:spPr>
+        <p:txBody>
+          <a:bodyPr wrap="square" rtlCol="0">
+            <a:spAutoFit/>
+          </a:bodyPr>
+          <a:lstStyle/>
+          <a:p>
+            <a:r>
+              <a:rPr lang="de-DE" sz="2400" dirty="0" err="1"/>
+              <a:t>Multiplicative decomposition: </a:t>
+            </a:r>
+            <a:r>
+              <a:rPr lang="de-DE" sz="2400" b="1" dirty="0" err="1"/>
+              <a:t>Airline passengers</a:t>
+            </a:r>
+          </a:p>
+        </p:txBody>
+      </p:sp>
+      <p:pic>
+        <p:nvPicPr>
+          <p:cNvPr id="13314" name="Picture 2">
+            <a:extLst>
+              <a:ext uri="{FF2B5EF4-FFF2-40B4-BE49-F238E27FC236}">
+                <a16:creationId xmlns:a16="http://schemas.microsoft.com/office/drawing/2014/main" id="{961C1735-4B25-D842-BBA8-7A95483A754F}"/>
+              </a:ext>
+            </a:extLst>
+          </p:cNvPr>
+          <p:cNvPicPr>
+            <a:picLocks noChangeAspect="1" noChangeArrowheads="1"/>
+          </p:cNvPicPr>
+          <p:nvPr/>
+        </p:nvPicPr>
+        <p:blipFill>
+          <a:blip r:embed="rId3">
+            <a:extLst>
+              <a:ext uri="{28A0092B-C50C-407E-A947-70E740481C1C}">
+                <a14:useLocalDpi xmlns:a14="http://schemas.microsoft.com/office/drawing/2010/main" val="0"/>
+              </a:ext>
+            </a:extLst>
+          </a:blip>
+          <a:srcRect/>
+          <a:stretch>
+            <a:fillRect/>
+          </a:stretch>
+        </p:blipFill>
+        <p:spPr bwMode="auto">
+          <a:xfrm>
+            <a:off x="438150" y="920667"/>
+            <a:ext cx="11315700" cy="3581400"/>
+          </a:xfrm>
+          <a:prstGeom prst="rect">
+            <a:avLst/>
+          </a:prstGeom>
+          <a:noFill/>
+          <a:extLst>
+            <a:ext uri="{909E8E84-426E-40DD-AFC4-6F175D3DCCD1}">
+              <a14:hiddenFill xmlns:a14="http://schemas.microsoft.com/office/drawing/2010/main">
+                <a:solidFill>
+                  <a:srgbClr val="FFFFFF"/>
+                </a:solidFill>
+              </a14:hiddenFill>
+            </a:ext>
+          </a:extLst>
+        </p:spPr>
+      </p:pic>
+      <p:sp>
+        <p:nvSpPr>
+          <p:cNvPr id="2" name="Textfeld 1">
+            <a:extLst>
+              <a:ext uri="{FF2B5EF4-FFF2-40B4-BE49-F238E27FC236}">
+                <a16:creationId xmlns:a16="http://schemas.microsoft.com/office/drawing/2014/main" id="{64D2ABDF-B09A-8C4F-8833-C6C3F62D8438}"/>
+              </a:ext>
+            </a:extLst>
+          </p:cNvPr>
+          <p:cNvSpPr txBox="1"/>
+          <p:nvPr/>
+        </p:nvSpPr>
+        <p:spPr>
+          <a:xfrm>
+            <a:off x="365769" y="4701278"/>
+            <a:ext cx="8257370" cy="400110"/>
+          </a:xfrm>
+          <a:prstGeom prst="rect">
+            <a:avLst/>
+          </a:prstGeom>
+          <a:noFill/>
+        </p:spPr>
+        <p:txBody>
+          <a:bodyPr wrap="square" rtlCol="0">
+            <a:spAutoFit/>
+          </a:bodyPr>
+          <a:lstStyle/>
+          <a:p>
+            <a:r>
+              <a:rPr lang="de-DE" sz="2000" dirty="0">
+                <a:sym typeface="Wingdings" pitchFamily="2" charset="2"/>
+              </a:rPr>
+              <a:t>Try: Input scaled to [0,1] de-trended absolute values into baseESN (next slide!)</a:t>
+            </a:r>
+            <a:endParaRPr lang="de-DE" sz="2000"/>
+          </a:p>
+        </p:txBody>
+      </p:sp>
+      <p:pic>
+        <p:nvPicPr>
+          <p:cNvPr id="3" name="Grafik 2">
+            <a:extLst>
+              <a:ext uri="{FF2B5EF4-FFF2-40B4-BE49-F238E27FC236}">
+                <a16:creationId xmlns:a16="http://schemas.microsoft.com/office/drawing/2014/main" id="{C95D2086-88B5-2D47-9383-A9AA8E04226A}"/>
+              </a:ext>
+            </a:extLst>
+          </p:cNvPr>
+          <p:cNvPicPr>
+            <a:picLocks noChangeAspect="1"/>
+          </p:cNvPicPr>
+          <p:nvPr/>
+        </p:nvPicPr>
+        <p:blipFill>
+          <a:blip r:embed="rId4"/>
+          <a:stretch>
+            <a:fillRect/>
+          </a:stretch>
+        </p:blipFill>
+        <p:spPr>
+          <a:xfrm>
+            <a:off x="438150" y="5205563"/>
+            <a:ext cx="9626600" cy="1498600"/>
+          </a:xfrm>
+          <a:prstGeom prst="rect">
+            <a:avLst/>
+          </a:prstGeom>
+          <a:ln>
+            <a:solidFill>
+              <a:schemeClr val="tx1"/>
+            </a:solidFill>
+          </a:ln>
+        </p:spPr>
+      </p:pic>
+    </p:spTree>
+    <p:extLst>
+      <p:ext uri="{BB962C8B-B14F-4D97-AF65-F5344CB8AC3E}">
+        <p14:creationId xmlns:p14="http://schemas.microsoft.com/office/powerpoint/2010/main" val="214188312"/>
+      </p:ext>
+    </p:extLst>
+  </p:cSld>
+  <p:clrMapOvr>
+    <a:masterClrMapping/>
+  </p:clrMapOvr>
+</p:sld>
+</file>
+
 <file path=ppt/slides/slide2.xml><?xml version="1.0" encoding="utf-8"?>
 <p:sld xmlns:a="http://schemas.openxmlformats.org/drawingml/2006/main" xmlns:r="http://schemas.openxmlformats.org/officeDocument/2006/relationships" xmlns:p="http://schemas.openxmlformats.org/presentationml/2006/main">
   <p:cSld>
@@ -6795,6 +10359,440 @@
     <p:extLst>
       <p:ext uri="{BB962C8B-B14F-4D97-AF65-F5344CB8AC3E}">
         <p14:creationId xmlns:p14="http://schemas.microsoft.com/office/powerpoint/2010/main" val="939770524"/>
+      </p:ext>
+    </p:extLst>
+  </p:cSld>
+  <p:clrMapOvr>
+    <a:masterClrMapping/>
+  </p:clrMapOvr>
+</p:sld>
+</file>
+
+<file path=ppt/slides/slide20.xml><?xml version="1.0" encoding="utf-8"?>
+<p:sld xmlns:a="http://schemas.openxmlformats.org/drawingml/2006/main" xmlns:r="http://schemas.openxmlformats.org/officeDocument/2006/relationships" xmlns:p="http://schemas.openxmlformats.org/presentationml/2006/main">
+  <p:cSld>
+    <p:spTree>
+      <p:nvGrpSpPr>
+        <p:cNvPr id="1" name=""/>
+        <p:cNvGrpSpPr/>
+        <p:nvPr/>
+      </p:nvGrpSpPr>
+      <p:grpSpPr>
+        <a:xfrm>
+          <a:off x="0" y="0"/>
+          <a:ext cx="0" cy="0"/>
+          <a:chOff x="0" y="0"/>
+          <a:chExt cx="0" cy="0"/>
+        </a:xfrm>
+      </p:grpSpPr>
+      <p:pic>
+        <p:nvPicPr>
+          <p:cNvPr id="16388" name="Picture 4">
+            <a:extLst>
+              <a:ext uri="{FF2B5EF4-FFF2-40B4-BE49-F238E27FC236}">
+                <a16:creationId xmlns:a16="http://schemas.microsoft.com/office/drawing/2014/main" id="{13BA4D4E-271C-9847-A4ED-2C500738B499}"/>
+              </a:ext>
+            </a:extLst>
+          </p:cNvPr>
+          <p:cNvPicPr>
+            <a:picLocks noChangeAspect="1" noChangeArrowheads="1"/>
+          </p:cNvPicPr>
+          <p:nvPr/>
+        </p:nvPicPr>
+        <p:blipFill>
+          <a:blip r:embed="rId3">
+            <a:extLst>
+              <a:ext uri="{28A0092B-C50C-407E-A947-70E740481C1C}">
+                <a14:useLocalDpi xmlns:a14="http://schemas.microsoft.com/office/drawing/2010/main" val="0"/>
+              </a:ext>
+            </a:extLst>
+          </a:blip>
+          <a:srcRect/>
+          <a:stretch>
+            <a:fillRect/>
+          </a:stretch>
+        </p:blipFill>
+        <p:spPr bwMode="auto">
+          <a:xfrm>
+            <a:off x="0" y="0"/>
+            <a:ext cx="7174053" cy="3767128"/>
+          </a:xfrm>
+          <a:prstGeom prst="rect">
+            <a:avLst/>
+          </a:prstGeom>
+          <a:noFill/>
+          <a:extLst>
+            <a:ext uri="{909E8E84-426E-40DD-AFC4-6F175D3DCCD1}">
+              <a14:hiddenFill xmlns:a14="http://schemas.microsoft.com/office/drawing/2010/main">
+                <a:solidFill>
+                  <a:srgbClr val="FFFFFF"/>
+                </a:solidFill>
+              </a14:hiddenFill>
+            </a:ext>
+          </a:extLst>
+        </p:spPr>
+      </p:pic>
+      <p:pic>
+        <p:nvPicPr>
+          <p:cNvPr id="16390" name="Picture 6">
+            <a:extLst>
+              <a:ext uri="{FF2B5EF4-FFF2-40B4-BE49-F238E27FC236}">
+                <a16:creationId xmlns:a16="http://schemas.microsoft.com/office/drawing/2014/main" id="{A3AC2E07-52AD-CC44-AFC6-330C5EF59CA8}"/>
+              </a:ext>
+            </a:extLst>
+          </p:cNvPr>
+          <p:cNvPicPr>
+            <a:picLocks noChangeAspect="1" noChangeArrowheads="1"/>
+          </p:cNvPicPr>
+          <p:nvPr/>
+        </p:nvPicPr>
+        <p:blipFill>
+          <a:blip r:embed="rId4">
+            <a:extLst>
+              <a:ext uri="{28A0092B-C50C-407E-A947-70E740481C1C}">
+                <a14:useLocalDpi xmlns:a14="http://schemas.microsoft.com/office/drawing/2010/main" val="0"/>
+              </a:ext>
+            </a:extLst>
+          </a:blip>
+          <a:srcRect/>
+          <a:stretch>
+            <a:fillRect/>
+          </a:stretch>
+        </p:blipFill>
+        <p:spPr bwMode="auto">
+          <a:xfrm>
+            <a:off x="4943906" y="3090872"/>
+            <a:ext cx="7114019" cy="3767128"/>
+          </a:xfrm>
+          <a:prstGeom prst="rect">
+            <a:avLst/>
+          </a:prstGeom>
+          <a:noFill/>
+          <a:extLst>
+            <a:ext uri="{909E8E84-426E-40DD-AFC4-6F175D3DCCD1}">
+              <a14:hiddenFill xmlns:a14="http://schemas.microsoft.com/office/drawing/2010/main">
+                <a:solidFill>
+                  <a:srgbClr val="FFFFFF"/>
+                </a:solidFill>
+              </a14:hiddenFill>
+            </a:ext>
+          </a:extLst>
+        </p:spPr>
+      </p:pic>
+      <p:sp>
+        <p:nvSpPr>
+          <p:cNvPr id="12" name="Textfeld 11">
+            <a:extLst>
+              <a:ext uri="{FF2B5EF4-FFF2-40B4-BE49-F238E27FC236}">
+                <a16:creationId xmlns:a16="http://schemas.microsoft.com/office/drawing/2014/main" id="{F53CAB6A-8675-2245-9785-1F9F50C6EF5B}"/>
+              </a:ext>
+            </a:extLst>
+          </p:cNvPr>
+          <p:cNvSpPr txBox="1"/>
+          <p:nvPr/>
+        </p:nvSpPr>
+        <p:spPr>
+          <a:xfrm>
+            <a:off x="7224907" y="481532"/>
+            <a:ext cx="2552016" cy="923330"/>
+          </a:xfrm>
+          <a:prstGeom prst="rect">
+            <a:avLst/>
+          </a:prstGeom>
+          <a:noFill/>
+        </p:spPr>
+        <p:txBody>
+          <a:bodyPr wrap="square" rtlCol="0">
+            <a:spAutoFit/>
+          </a:bodyPr>
+          <a:lstStyle/>
+          <a:p>
+            <a:r>
+              <a:rPr lang="de-DE"/>
+              <a:t>input_length = 10</a:t>
+            </a:r>
+          </a:p>
+          <a:p>
+            <a:r>
+              <a:rPr lang="de-DE">
+                <a:solidFill>
+                  <a:srgbClr val="FF0000"/>
+                </a:solidFill>
+              </a:rPr>
+              <a:t>target_length = 1</a:t>
+            </a:r>
+          </a:p>
+          <a:p>
+            <a:r>
+              <a:rPr lang="de-DE">
+                <a:solidFill>
+                  <a:srgbClr val="FF0000"/>
+                </a:solidFill>
+                <a:sym typeface="Wingdings" pitchFamily="2" charset="2"/>
+              </a:rPr>
+              <a:t> no lag</a:t>
+            </a:r>
+            <a:endParaRPr lang="de-DE">
+              <a:solidFill>
+                <a:srgbClr val="FF0000"/>
+              </a:solidFill>
+            </a:endParaRPr>
+          </a:p>
+        </p:txBody>
+      </p:sp>
+      <p:sp>
+        <p:nvSpPr>
+          <p:cNvPr id="13" name="Textfeld 12">
+            <a:extLst>
+              <a:ext uri="{FF2B5EF4-FFF2-40B4-BE49-F238E27FC236}">
+                <a16:creationId xmlns:a16="http://schemas.microsoft.com/office/drawing/2014/main" id="{3393E574-BA2D-EE40-8992-F17B73B75B36}"/>
+              </a:ext>
+            </a:extLst>
+          </p:cNvPr>
+          <p:cNvSpPr txBox="1"/>
+          <p:nvPr/>
+        </p:nvSpPr>
+        <p:spPr>
+          <a:xfrm>
+            <a:off x="3025226" y="5634196"/>
+            <a:ext cx="2552016" cy="923330"/>
+          </a:xfrm>
+          <a:prstGeom prst="rect">
+            <a:avLst/>
+          </a:prstGeom>
+          <a:noFill/>
+        </p:spPr>
+        <p:txBody>
+          <a:bodyPr wrap="square" rtlCol="0">
+            <a:spAutoFit/>
+          </a:bodyPr>
+          <a:lstStyle/>
+          <a:p>
+            <a:r>
+              <a:rPr lang="de-DE"/>
+              <a:t>input_length = 10</a:t>
+            </a:r>
+          </a:p>
+          <a:p>
+            <a:r>
+              <a:rPr lang="de-DE">
+                <a:solidFill>
+                  <a:srgbClr val="FF0000"/>
+                </a:solidFill>
+              </a:rPr>
+              <a:t>target_length = 3</a:t>
+            </a:r>
+          </a:p>
+          <a:p>
+            <a:r>
+              <a:rPr lang="de-DE">
+                <a:solidFill>
+                  <a:srgbClr val="FF0000"/>
+                </a:solidFill>
+                <a:sym typeface="Wingdings" pitchFamily="2" charset="2"/>
+              </a:rPr>
+              <a:t> no lag</a:t>
+            </a:r>
+            <a:endParaRPr lang="de-DE">
+              <a:solidFill>
+                <a:srgbClr val="FF0000"/>
+              </a:solidFill>
+            </a:endParaRPr>
+          </a:p>
+        </p:txBody>
+      </p:sp>
+    </p:spTree>
+    <p:extLst>
+      <p:ext uri="{BB962C8B-B14F-4D97-AF65-F5344CB8AC3E}">
+        <p14:creationId xmlns:p14="http://schemas.microsoft.com/office/powerpoint/2010/main" val="2919403465"/>
+      </p:ext>
+    </p:extLst>
+  </p:cSld>
+  <p:clrMapOvr>
+    <a:masterClrMapping/>
+  </p:clrMapOvr>
+</p:sld>
+</file>
+
+<file path=ppt/slides/slide21.xml><?xml version="1.0" encoding="utf-8"?>
+<p:sld xmlns:a="http://schemas.openxmlformats.org/drawingml/2006/main" xmlns:r="http://schemas.openxmlformats.org/officeDocument/2006/relationships" xmlns:p="http://schemas.openxmlformats.org/presentationml/2006/main">
+  <p:cSld>
+    <p:spTree>
+      <p:nvGrpSpPr>
+        <p:cNvPr id="1" name=""/>
+        <p:cNvGrpSpPr/>
+        <p:nvPr/>
+      </p:nvGrpSpPr>
+      <p:grpSpPr>
+        <a:xfrm>
+          <a:off x="0" y="0"/>
+          <a:ext cx="0" cy="0"/>
+          <a:chOff x="0" y="0"/>
+          <a:chExt cx="0" cy="0"/>
+        </a:xfrm>
+      </p:grpSpPr>
+      <p:sp>
+        <p:nvSpPr>
+          <p:cNvPr id="13" name="Textfeld 12">
+            <a:extLst>
+              <a:ext uri="{FF2B5EF4-FFF2-40B4-BE49-F238E27FC236}">
+                <a16:creationId xmlns:a16="http://schemas.microsoft.com/office/drawing/2014/main" id="{3393E574-BA2D-EE40-8992-F17B73B75B36}"/>
+              </a:ext>
+            </a:extLst>
+          </p:cNvPr>
+          <p:cNvSpPr txBox="1"/>
+          <p:nvPr/>
+        </p:nvSpPr>
+        <p:spPr>
+          <a:xfrm>
+            <a:off x="1011230" y="1224241"/>
+            <a:ext cx="8572608" cy="1323439"/>
+          </a:xfrm>
+          <a:prstGeom prst="rect">
+            <a:avLst/>
+          </a:prstGeom>
+          <a:noFill/>
+        </p:spPr>
+        <p:txBody>
+          <a:bodyPr wrap="square" rtlCol="0">
+            <a:spAutoFit/>
+          </a:bodyPr>
+          <a:lstStyle/>
+          <a:p>
+            <a:r>
+              <a:rPr lang="de-DE" sz="2000" b="1"/>
+              <a:t>Discussion on Airline Passengers</a:t>
+            </a:r>
+            <a:r>
+              <a:rPr lang="de-DE" sz="2000"/>
+              <a:t>:</a:t>
+            </a:r>
+          </a:p>
+          <a:p>
+            <a:pPr marL="285750" indent="-285750">
+              <a:buFontTx/>
+              <a:buChar char="-"/>
+            </a:pPr>
+            <a:r>
+              <a:rPr lang="de-DE" sz="2000"/>
+              <a:t>Raw data needs to be de-trended in an appropriate way.</a:t>
+            </a:r>
+          </a:p>
+          <a:p>
+            <a:pPr marL="285750" indent="-285750">
+              <a:buFontTx/>
+              <a:buChar char="-"/>
+            </a:pPr>
+            <a:r>
+              <a:rPr lang="de-DE" sz="2000"/>
+              <a:t>Can then successfully be modelled.</a:t>
+            </a:r>
+          </a:p>
+          <a:p>
+            <a:pPr marL="285750" indent="-285750">
+              <a:buFontTx/>
+              <a:buChar char="-"/>
+            </a:pPr>
+            <a:r>
+              <a:rPr lang="de-DE" sz="2000"/>
+              <a:t>No need for additional (external) information.</a:t>
+            </a:r>
+          </a:p>
+        </p:txBody>
+      </p:sp>
+    </p:spTree>
+    <p:extLst>
+      <p:ext uri="{BB962C8B-B14F-4D97-AF65-F5344CB8AC3E}">
+        <p14:creationId xmlns:p14="http://schemas.microsoft.com/office/powerpoint/2010/main" val="2220153784"/>
+      </p:ext>
+    </p:extLst>
+  </p:cSld>
+  <p:clrMapOvr>
+    <a:masterClrMapping/>
+  </p:clrMapOvr>
+</p:sld>
+</file>
+
+<file path=ppt/slides/slide22.xml><?xml version="1.0" encoding="utf-8"?>
+<p:sld xmlns:a="http://schemas.openxmlformats.org/drawingml/2006/main" xmlns:r="http://schemas.openxmlformats.org/officeDocument/2006/relationships" xmlns:p="http://schemas.openxmlformats.org/presentationml/2006/main">
+  <p:cSld>
+    <p:spTree>
+      <p:nvGrpSpPr>
+        <p:cNvPr id="1" name=""/>
+        <p:cNvGrpSpPr/>
+        <p:nvPr/>
+      </p:nvGrpSpPr>
+      <p:grpSpPr>
+        <a:xfrm>
+          <a:off x="0" y="0"/>
+          <a:ext cx="0" cy="0"/>
+          <a:chOff x="0" y="0"/>
+          <a:chExt cx="0" cy="0"/>
+        </a:xfrm>
+      </p:grpSpPr>
+      <p:sp>
+        <p:nvSpPr>
+          <p:cNvPr id="13" name="Textfeld 12">
+            <a:extLst>
+              <a:ext uri="{FF2B5EF4-FFF2-40B4-BE49-F238E27FC236}">
+                <a16:creationId xmlns:a16="http://schemas.microsoft.com/office/drawing/2014/main" id="{3393E574-BA2D-EE40-8992-F17B73B75B36}"/>
+              </a:ext>
+            </a:extLst>
+          </p:cNvPr>
+          <p:cNvSpPr txBox="1"/>
+          <p:nvPr/>
+        </p:nvSpPr>
+        <p:spPr>
+          <a:xfrm>
+            <a:off x="1011230" y="1224241"/>
+            <a:ext cx="6165074" cy="1015663"/>
+          </a:xfrm>
+          <a:prstGeom prst="rect">
+            <a:avLst/>
+          </a:prstGeom>
+          <a:noFill/>
+        </p:spPr>
+        <p:txBody>
+          <a:bodyPr wrap="square" rtlCol="0">
+            <a:spAutoFit/>
+          </a:bodyPr>
+          <a:lstStyle/>
+          <a:p>
+            <a:r>
+              <a:rPr lang="de-DE" sz="2000" b="1"/>
+              <a:t>Next steps</a:t>
+            </a:r>
+            <a:r>
+              <a:rPr lang="de-DE" sz="2000"/>
+              <a:t>:</a:t>
+            </a:r>
+          </a:p>
+          <a:p>
+            <a:pPr marL="285750" indent="-285750">
+              <a:buFontTx/>
+              <a:buChar char="-"/>
+            </a:pPr>
+            <a:r>
+              <a:rPr lang="de-DE" sz="2000"/>
+              <a:t>tackle real-world problem (ENSO)</a:t>
+            </a:r>
+          </a:p>
+          <a:p>
+            <a:pPr marL="285750" indent="-285750">
+              <a:buFontTx/>
+              <a:buChar char="-"/>
+            </a:pPr>
+            <a:r>
+              <a:rPr lang="de-DE" sz="2000"/>
+              <a:t>pimp functions (trainESN, predESN, gridsearch)</a:t>
+            </a:r>
+          </a:p>
+        </p:txBody>
+      </p:sp>
+    </p:spTree>
+    <p:extLst>
+      <p:ext uri="{BB962C8B-B14F-4D97-AF65-F5344CB8AC3E}">
+        <p14:creationId xmlns:p14="http://schemas.microsoft.com/office/powerpoint/2010/main" val="1819285262"/>
       </p:ext>
     </p:extLst>
   </p:cSld>

</xml_diff>